<commit_message>
Updated slide deck with Tools and Plugins
</commit_message>
<xml_diff>
--- a/PhpStorm Workshop.pptx
+++ b/PhpStorm Workshop.pptx
@@ -5,7 +5,7 @@
     <p:sldMasterId id="2147483840" r:id="rId1"/>
   </p:sldMasterIdLst>
   <p:notesMasterIdLst>
-    <p:notesMasterId r:id="rId124"/>
+    <p:notesMasterId r:id="rId135"/>
   </p:notesMasterIdLst>
   <p:sldIdLst>
     <p:sldId id="256" r:id="rId2"/>
@@ -126,10 +126,21 @@
     <p:sldId id="400" r:id="rId117"/>
     <p:sldId id="401" r:id="rId118"/>
     <p:sldId id="319" r:id="rId119"/>
-    <p:sldId id="328" r:id="rId120"/>
-    <p:sldId id="324" r:id="rId121"/>
-    <p:sldId id="325" r:id="rId122"/>
-    <p:sldId id="259" r:id="rId123"/>
+    <p:sldId id="403" r:id="rId120"/>
+    <p:sldId id="404" r:id="rId121"/>
+    <p:sldId id="405" r:id="rId122"/>
+    <p:sldId id="407" r:id="rId123"/>
+    <p:sldId id="406" r:id="rId124"/>
+    <p:sldId id="408" r:id="rId125"/>
+    <p:sldId id="328" r:id="rId126"/>
+    <p:sldId id="411" r:id="rId127"/>
+    <p:sldId id="412" r:id="rId128"/>
+    <p:sldId id="413" r:id="rId129"/>
+    <p:sldId id="409" r:id="rId130"/>
+    <p:sldId id="324" r:id="rId131"/>
+    <p:sldId id="410" r:id="rId132"/>
+    <p:sldId id="325" r:id="rId133"/>
+    <p:sldId id="259" r:id="rId134"/>
   </p:sldIdLst>
   <p:sldSz cx="12192000" cy="6858000"/>
   <p:notesSz cx="6858000" cy="9144000"/>
@@ -318,7 +329,7 @@
           <a:p>
             <a:fld id="{452BE2B3-0986-4328-AEFF-1FEDD7FB83AD}" type="datetimeFigureOut">
               <a:rPr lang="nl-BE" smtClean="0"/>
-              <a:t>7/01/2014</a:t>
+              <a:t>8/01/2014</a:t>
             </a:fld>
             <a:endParaRPr lang="nl-BE"/>
           </a:p>
@@ -5056,11 +5067,7 @@
           <a:p>
             <a:r>
               <a:rPr lang="en-US" dirty="0" smtClean="0"/>
-              <a:t>Products all </a:t>
-            </a:r>
-            <a:r>
-              <a:rPr lang="en-US" dirty="0" smtClean="0"/>
-              <a:t>use different terms…</a:t>
+              <a:t>Products all use different terms…</a:t>
             </a:r>
             <a:endParaRPr lang="nl-BE" dirty="0"/>
           </a:p>
@@ -5347,15 +5354,7 @@
           <a:p>
             <a:r>
               <a:rPr lang="en-US" dirty="0" smtClean="0"/>
-              <a:t>But </a:t>
-            </a:r>
-            <a:r>
-              <a:rPr lang="en-US" dirty="0" smtClean="0"/>
-              <a:t>they </a:t>
-            </a:r>
-            <a:r>
-              <a:rPr lang="en-US" dirty="0" smtClean="0"/>
-              <a:t>are similar in nature!</a:t>
+              <a:t>But they are similar in nature!</a:t>
             </a:r>
             <a:endParaRPr lang="nl-BE" dirty="0"/>
           </a:p>
@@ -8316,7 +8315,6 @@
               <a:rPr lang="nl-BE" sz="1600" dirty="0"/>
               <a:t>Ctrl+Space / Ctrl+Shift+Space</a:t>
             </a:r>
-            <a:endParaRPr lang="nl-BE" sz="1600" dirty="0"/>
           </a:p>
         </p:txBody>
       </p:sp>
@@ -8413,11 +8411,7 @@
           <a:p>
             <a:r>
               <a:rPr lang="nl-BE" dirty="0" smtClean="0"/>
-              <a:t>REST Client, Vagrant, </a:t>
-            </a:r>
-            <a:r>
-              <a:rPr lang="nl-BE" dirty="0" smtClean="0"/>
-              <a:t>Composer, CmdLine Tools</a:t>
+              <a:t>Tools</a:t>
             </a:r>
             <a:endParaRPr lang="nl-BE" dirty="0"/>
           </a:p>
@@ -8486,58 +8480,82 @@
             <a:spLocks noGrp="1"/>
           </p:cNvSpPr>
           <p:nvPr>
-            <p:ph type="ctrTitle"/>
+            <p:ph type="title"/>
           </p:nvPr>
         </p:nvSpPr>
         <p:spPr/>
         <p:txBody>
+          <a:bodyPr>
+            <a:normAutofit/>
+          </a:bodyPr>
+          <a:lstStyle/>
+          <a:p>
+            <a:r>
+              <a:rPr lang="nl-BE" dirty="0" smtClean="0"/>
+              <a:t>REST Client</a:t>
+            </a:r>
+            <a:endParaRPr lang="nl-BE" dirty="0"/>
+          </a:p>
+        </p:txBody>
+      </p:sp>
+      <p:sp>
+        <p:nvSpPr>
+          <p:cNvPr id="5" name="Content Placeholder 4"/>
+          <p:cNvSpPr>
+            <a:spLocks noGrp="1"/>
+          </p:cNvSpPr>
+          <p:nvPr>
+            <p:ph sz="half" idx="1"/>
+          </p:nvPr>
+        </p:nvSpPr>
+        <p:spPr/>
+        <p:txBody>
           <a:bodyPr/>
           <a:lstStyle/>
           <a:p>
             <a:r>
-              <a:rPr lang="nl-BE" dirty="0" smtClean="0"/>
-              <a:t>Plugins</a:t>
-            </a:r>
-            <a:endParaRPr lang="nl-BE" dirty="0"/>
-          </a:p>
-        </p:txBody>
-      </p:sp>
-      <p:sp>
-        <p:nvSpPr>
-          <p:cNvPr id="5" name="Subtitle 4"/>
-          <p:cNvSpPr>
-            <a:spLocks noGrp="1"/>
-          </p:cNvSpPr>
-          <p:nvPr>
-            <p:ph type="subTitle" idx="1"/>
-          </p:nvPr>
-        </p:nvSpPr>
-        <p:spPr/>
-        <p:txBody>
-          <a:bodyPr/>
-          <a:lstStyle/>
-          <a:p>
-            <a:endParaRPr lang="nl-BE"/>
-          </a:p>
-        </p:txBody>
-      </p:sp>
+              <a:rPr lang="en-US" dirty="0"/>
+              <a:t>The built-in REST client allows testing web API's. Build requests, inspect responses.</a:t>
+            </a:r>
+          </a:p>
+        </p:txBody>
+      </p:sp>
+      <p:pic>
+        <p:nvPicPr>
+          <p:cNvPr id="6" name="Content Placeholder 5"/>
+          <p:cNvPicPr>
+            <a:picLocks noGrp="1" noChangeAspect="1"/>
+          </p:cNvPicPr>
+          <p:nvPr>
+            <p:ph sz="half" idx="2"/>
+          </p:nvPr>
+        </p:nvPicPr>
+        <p:blipFill>
+          <a:blip r:embed="rId2"/>
+          <a:stretch>
+            <a:fillRect/>
+          </a:stretch>
+        </p:blipFill>
+        <p:spPr>
+          <a:xfrm>
+            <a:off x="4588615" y="2883614"/>
+            <a:ext cx="7508983" cy="2348925"/>
+          </a:xfrm>
+          <a:prstGeom prst="rect">
+            <a:avLst/>
+          </a:prstGeom>
+        </p:spPr>
+      </p:pic>
     </p:spTree>
     <p:extLst>
       <p:ext uri="{BB962C8B-B14F-4D97-AF65-F5344CB8AC3E}">
-        <p14:creationId xmlns:p14="http://schemas.microsoft.com/office/powerpoint/2010/main" val="1579485310"/>
+        <p14:creationId xmlns:p14="http://schemas.microsoft.com/office/powerpoint/2010/main" val="2275835774"/>
       </p:ext>
     </p:extLst>
   </p:cSld>
   <p:clrMapOvr>
     <a:masterClrMapping/>
   </p:clrMapOvr>
-  <p:timing>
-    <p:tnLst>
-      <p:par>
-        <p:cTn id="1" dur="indefinite" restart="never" nodeType="tmRoot"/>
-      </p:par>
-    </p:tnLst>
-  </p:timing>
 </p:sld>
 </file>
 
@@ -8702,106 +8720,110 @@
         </p:nvSpPr>
         <p:spPr/>
         <p:txBody>
+          <a:bodyPr>
+            <a:normAutofit/>
+          </a:bodyPr>
+          <a:lstStyle/>
+          <a:p>
+            <a:r>
+              <a:rPr lang="nl-BE" dirty="0" smtClean="0"/>
+              <a:t>Composer</a:t>
+            </a:r>
+            <a:endParaRPr lang="nl-BE" dirty="0"/>
+          </a:p>
+        </p:txBody>
+      </p:sp>
+      <p:sp>
+        <p:nvSpPr>
+          <p:cNvPr id="5" name="Content Placeholder 4"/>
+          <p:cNvSpPr>
+            <a:spLocks noGrp="1"/>
+          </p:cNvSpPr>
+          <p:nvPr>
+            <p:ph sz="half" idx="1"/>
+          </p:nvPr>
+        </p:nvSpPr>
+        <p:spPr/>
+        <p:txBody>
           <a:bodyPr/>
           <a:lstStyle/>
           <a:p>
             <a:r>
-              <a:rPr lang="nl-BE" dirty="0" smtClean="0"/>
-              <a:t>TODO what about</a:t>
-            </a:r>
-            <a:endParaRPr lang="nl-BE" dirty="0"/>
-          </a:p>
-        </p:txBody>
-      </p:sp>
-      <p:sp>
-        <p:nvSpPr>
-          <p:cNvPr id="5" name="Content Placeholder 4"/>
-          <p:cNvSpPr>
-            <a:spLocks noGrp="1"/>
-          </p:cNvSpPr>
-          <p:nvPr>
-            <p:ph idx="1"/>
-          </p:nvPr>
-        </p:nvSpPr>
-        <p:spPr/>
-        <p:txBody>
-          <a:bodyPr>
-            <a:normAutofit fontScale="92500" lnSpcReduction="10000"/>
-          </a:bodyPr>
-          <a:lstStyle/>
-          <a:p>
-            <a:r>
-              <a:rPr lang="nl-BE" dirty="0" smtClean="0"/>
-              <a:t>File Watchers</a:t>
-            </a:r>
-          </a:p>
-          <a:p>
-            <a:r>
-              <a:rPr lang="nl-BE" dirty="0" smtClean="0"/>
-              <a:t>Google App Engine</a:t>
-            </a:r>
-          </a:p>
-          <a:p>
-            <a:r>
-              <a:rPr lang="nl-BE" dirty="0" smtClean="0"/>
-              <a:t>Remote </a:t>
-            </a:r>
-            <a:r>
-              <a:rPr lang="nl-BE" dirty="0" smtClean="0"/>
-              <a:t>Tools / Deployment</a:t>
-            </a:r>
-          </a:p>
-          <a:p>
-            <a:r>
-              <a:rPr lang="nl-BE" dirty="0" smtClean="0"/>
-              <a:t>SSH Console</a:t>
-            </a:r>
-          </a:p>
-          <a:p>
-            <a:r>
-              <a:rPr lang="nl-BE" dirty="0" smtClean="0"/>
-              <a:t>Drupal </a:t>
-            </a:r>
-            <a:r>
-              <a:rPr lang="nl-BE" dirty="0" smtClean="0"/>
-              <a:t>Support</a:t>
-            </a:r>
-          </a:p>
-          <a:p>
-            <a:r>
-              <a:rPr lang="nl-BE" dirty="0" smtClean="0"/>
-              <a:t>Live Edit</a:t>
-            </a:r>
-          </a:p>
-          <a:p>
-            <a:r>
-              <a:rPr lang="nl-BE" dirty="0" smtClean="0"/>
-              <a:t>Issue Tracker</a:t>
-            </a:r>
-          </a:p>
-          <a:p>
-            <a:r>
-              <a:rPr lang="nl-BE" dirty="0" smtClean="0"/>
-              <a:t>HTML, CSS, JS </a:t>
-            </a:r>
-            <a:r>
-              <a:rPr lang="nl-BE" dirty="0" smtClean="0"/>
-              <a:t>tools</a:t>
-            </a:r>
-          </a:p>
-          <a:p>
-            <a:r>
-              <a:rPr lang="nl-BE" dirty="0" smtClean="0"/>
-              <a:t>Framework Integration</a:t>
-            </a:r>
-            <a:endParaRPr lang="nl-BE" dirty="0"/>
-          </a:p>
-        </p:txBody>
-      </p:sp>
+              <a:rPr lang="en-US" dirty="0" smtClean="0"/>
+              <a:t>Work with </a:t>
+            </a:r>
+            <a:r>
+              <a:rPr lang="en-US" dirty="0" smtClean="0">
+                <a:hlinkClick r:id="rId2"/>
+              </a:rPr>
+              <a:t>Composer</a:t>
+            </a:r>
+            <a:r>
+              <a:rPr lang="en-US" dirty="0" smtClean="0"/>
+              <a:t> dependency manager in the IDE.</a:t>
+            </a:r>
+          </a:p>
+          <a:p>
+            <a:pPr lvl="1"/>
+            <a:r>
+              <a:rPr lang="en-US" dirty="0" smtClean="0"/>
+              <a:t>Initialize Composer</a:t>
+            </a:r>
+          </a:p>
+          <a:p>
+            <a:pPr lvl="1"/>
+            <a:r>
+              <a:rPr lang="en-US" dirty="0" smtClean="0"/>
+              <a:t>Search and install Composer dependencies</a:t>
+            </a:r>
+          </a:p>
+          <a:p>
+            <a:pPr lvl="1"/>
+            <a:r>
+              <a:rPr lang="en-US" dirty="0" smtClean="0"/>
+              <a:t>Create new project using Composer project type.</a:t>
+            </a:r>
+          </a:p>
+          <a:p>
+            <a:pPr lvl="1"/>
+            <a:r>
+              <a:rPr lang="en-US" dirty="0" smtClean="0"/>
+              <a:t>Command Line Tools (see further)</a:t>
+            </a:r>
+            <a:endParaRPr lang="en-US" dirty="0"/>
+          </a:p>
+        </p:txBody>
+      </p:sp>
+      <p:pic>
+        <p:nvPicPr>
+          <p:cNvPr id="6" name="Content Placeholder 5"/>
+          <p:cNvPicPr>
+            <a:picLocks noGrp="1" noChangeAspect="1"/>
+          </p:cNvPicPr>
+          <p:nvPr>
+            <p:ph sz="half" idx="2"/>
+          </p:nvPr>
+        </p:nvPicPr>
+        <p:blipFill>
+          <a:blip r:embed="rId3"/>
+          <a:stretch>
+            <a:fillRect/>
+          </a:stretch>
+        </p:blipFill>
+        <p:spPr>
+          <a:xfrm>
+            <a:off x="5380897" y="2194089"/>
+            <a:ext cx="6205771" cy="3376285"/>
+          </a:xfrm>
+          <a:prstGeom prst="rect">
+            <a:avLst/>
+          </a:prstGeom>
+        </p:spPr>
+      </p:pic>
     </p:spTree>
     <p:extLst>
       <p:ext uri="{BB962C8B-B14F-4D97-AF65-F5344CB8AC3E}">
-        <p14:creationId xmlns:p14="http://schemas.microsoft.com/office/powerpoint/2010/main" val="2796552828"/>
+        <p14:creationId xmlns:p14="http://schemas.microsoft.com/office/powerpoint/2010/main" val="530909169"/>
       </p:ext>
     </p:extLst>
   </p:cSld>
@@ -8840,29 +8862,6 @@
         </p:nvSpPr>
         <p:spPr/>
         <p:txBody>
-          <a:bodyPr/>
-          <a:lstStyle/>
-          <a:p>
-            <a:r>
-              <a:rPr lang="nl-BE" dirty="0" smtClean="0"/>
-              <a:t>Resources</a:t>
-            </a:r>
-            <a:endParaRPr lang="nl-BE" dirty="0"/>
-          </a:p>
-        </p:txBody>
-      </p:sp>
-      <p:sp>
-        <p:nvSpPr>
-          <p:cNvPr id="5" name="Content Placeholder 4"/>
-          <p:cNvSpPr>
-            <a:spLocks noGrp="1"/>
-          </p:cNvSpPr>
-          <p:nvPr>
-            <p:ph idx="1"/>
-          </p:nvPr>
-        </p:nvSpPr>
-        <p:spPr/>
-        <p:txBody>
           <a:bodyPr>
             <a:normAutofit/>
           </a:bodyPr>
@@ -8870,197 +8869,228 @@
           <a:p>
             <a:r>
               <a:rPr lang="nl-BE" dirty="0" smtClean="0"/>
-              <a:t>Keyboard reference - </a:t>
-            </a:r>
-            <a:r>
-              <a:rPr lang="en-US" dirty="0" smtClean="0">
-                <a:hlinkClick r:id="rId2"/>
-              </a:rPr>
-              <a:t>http</a:t>
-            </a:r>
-            <a:r>
-              <a:rPr lang="en-US" dirty="0">
-                <a:hlinkClick r:id="rId2"/>
-              </a:rPr>
-              <a:t>://</a:t>
-            </a:r>
-            <a:r>
-              <a:rPr lang="en-US" dirty="0" smtClean="0">
-                <a:hlinkClick r:id="rId2"/>
-              </a:rPr>
-              <a:t>bit.ly/phpstorm-shortcuts</a:t>
-            </a:r>
-            <a:endParaRPr lang="en-US" dirty="0" smtClean="0"/>
-          </a:p>
+              <a:t>Command Line Tools</a:t>
+            </a:r>
+            <a:endParaRPr lang="nl-BE" dirty="0"/>
+          </a:p>
+        </p:txBody>
+      </p:sp>
+      <p:sp>
+        <p:nvSpPr>
+          <p:cNvPr id="5" name="Content Placeholder 4"/>
+          <p:cNvSpPr>
+            <a:spLocks noGrp="1"/>
+          </p:cNvSpPr>
+          <p:nvPr>
+            <p:ph sz="half" idx="1"/>
+          </p:nvPr>
+        </p:nvSpPr>
+        <p:spPr/>
+        <p:txBody>
+          <a:bodyPr/>
+          <a:lstStyle/>
           <a:p>
             <a:r>
               <a:rPr lang="en-US" dirty="0" smtClean="0"/>
-              <a:t>Blog - </a:t>
-            </a:r>
-            <a:r>
-              <a:rPr lang="en-US" dirty="0" smtClean="0">
-                <a:hlinkClick r:id="rId3"/>
-              </a:rPr>
-              <a:t>http</a:t>
-            </a:r>
-            <a:r>
-              <a:rPr lang="en-US" dirty="0">
-                <a:hlinkClick r:id="rId3"/>
-              </a:rPr>
-              <a:t>://blog.jetbrains.com/phpstorm</a:t>
-            </a:r>
-            <a:r>
-              <a:rPr lang="en-US" dirty="0" smtClean="0">
-                <a:hlinkClick r:id="rId3"/>
-              </a:rPr>
-              <a:t>/</a:t>
-            </a:r>
+              <a:t>Invoke command line tools shipped with frameworks and libraries.</a:t>
+            </a:r>
+          </a:p>
+          <a:p>
+            <a:pPr lvl="1"/>
             <a:r>
               <a:rPr lang="en-US" dirty="0" smtClean="0"/>
-              <a:t> </a:t>
-            </a:r>
-          </a:p>
-          <a:p>
-            <a:r>
-              <a:rPr lang="en-US" dirty="0"/>
-              <a:t>Web </a:t>
+              <a:t>Composer, </a:t>
+            </a:r>
+            <a:r>
+              <a:rPr lang="en-US" dirty="0" err="1" smtClean="0"/>
+              <a:t>Zend</a:t>
             </a:r>
             <a:r>
               <a:rPr lang="en-US" dirty="0" smtClean="0"/>
-              <a:t>Help - </a:t>
-            </a:r>
-            <a:r>
-              <a:rPr lang="en-US" dirty="0" smtClean="0">
-                <a:hlinkClick r:id="rId4"/>
-              </a:rPr>
-              <a:t>http</a:t>
-            </a:r>
-            <a:r>
-              <a:rPr lang="en-US" dirty="0">
-                <a:hlinkClick r:id="rId4"/>
-              </a:rPr>
-              <a:t>://www.jetbrains.com/phpstorm/webhelp</a:t>
-            </a:r>
-            <a:r>
-              <a:rPr lang="en-US" dirty="0" smtClean="0">
-                <a:hlinkClick r:id="rId4"/>
-              </a:rPr>
-              <a:t>/</a:t>
-            </a:r>
-            <a:endParaRPr lang="en-US" dirty="0" smtClean="0"/>
-          </a:p>
-          <a:p>
+              <a:t> Framework, </a:t>
+            </a:r>
+            <a:r>
+              <a:rPr lang="en-US" dirty="0" err="1" smtClean="0"/>
+              <a:t>Symfony</a:t>
+            </a:r>
             <a:r>
               <a:rPr lang="en-US" dirty="0" smtClean="0"/>
-              <a:t>Tutorials - </a:t>
-            </a:r>
-            <a:r>
-              <a:rPr lang="en-US" dirty="0" smtClean="0">
-                <a:hlinkClick r:id="rId5"/>
-              </a:rPr>
-              <a:t>http</a:t>
-            </a:r>
-            <a:r>
-              <a:rPr lang="en-US" dirty="0">
-                <a:hlinkClick r:id="rId5"/>
-              </a:rPr>
-              <a:t>://</a:t>
-            </a:r>
-            <a:r>
-              <a:rPr lang="en-US" dirty="0" smtClean="0">
-                <a:hlinkClick r:id="rId5"/>
-              </a:rPr>
-              <a:t>confluence.jetbrains.com/display/PhpStorm/Tutorials</a:t>
-            </a:r>
-            <a:endParaRPr lang="en-US" dirty="0" smtClean="0"/>
-          </a:p>
-          <a:p>
-            <a:r>
-              <a:rPr lang="en-US" dirty="0"/>
-              <a:t>Courseware (</a:t>
+              <a:t>, </a:t>
+            </a:r>
+            <a:r>
+              <a:rPr lang="en-US" dirty="0" err="1" smtClean="0"/>
+              <a:t>Symfony</a:t>
             </a:r>
             <a:r>
               <a:rPr lang="en-US" dirty="0" smtClean="0"/>
-              <a:t>videos</a:t>
-            </a:r>
-            <a:r>
-              <a:rPr lang="en-US" dirty="0"/>
-              <a:t>) – </a:t>
-            </a:r>
-            <a:r>
-              <a:rPr lang="en-US" dirty="0">
-                <a:hlinkClick r:id="rId6"/>
-              </a:rPr>
-              <a:t>http://</a:t>
-            </a:r>
-            <a:r>
-              <a:rPr lang="en-US" dirty="0" smtClean="0">
-                <a:hlinkClick r:id="rId6"/>
-              </a:rPr>
-              <a:t>bit.ly/phpstorm-videos</a:t>
+              <a:t> Console-based, </a:t>
+            </a:r>
+            <a:r>
+              <a:rPr lang="en-US" dirty="0" err="1" smtClean="0"/>
+              <a:t>Drush</a:t>
             </a:r>
             <a:r>
               <a:rPr lang="en-US" dirty="0" smtClean="0"/>
-              <a:t> </a:t>
+              <a:t> or roll your own</a:t>
+            </a:r>
+          </a:p>
+          <a:p>
+            <a:pPr lvl="1"/>
+            <a:r>
+              <a:rPr lang="en-US" dirty="0" err="1" smtClean="0"/>
+              <a:t>Autocompletion</a:t>
+            </a:r>
+            <a:r>
+              <a:rPr lang="en-US" dirty="0" smtClean="0"/>
+              <a:t> support</a:t>
+            </a:r>
+          </a:p>
+          <a:p>
+            <a:pPr lvl="1"/>
+            <a:r>
+              <a:rPr lang="en-US" dirty="0" smtClean="0"/>
+              <a:t>Not meant to be a full console/terminal!</a:t>
             </a:r>
             <a:endParaRPr lang="en-US" dirty="0"/>
           </a:p>
-          <a:p>
-            <a:r>
-              <a:rPr lang="en-US" dirty="0" smtClean="0"/>
-              <a:t>Webinars - </a:t>
-            </a:r>
-            <a:r>
-              <a:rPr lang="en-US" dirty="0" smtClean="0">
-                <a:hlinkClick r:id="rId7"/>
-              </a:rPr>
-              <a:t>http</a:t>
-            </a:r>
-            <a:r>
-              <a:rPr lang="en-US" dirty="0">
-                <a:hlinkClick r:id="rId7"/>
-              </a:rPr>
-              <a:t>://blog.jetbrains.com/phpstorm/tag/webinar</a:t>
-            </a:r>
-            <a:r>
-              <a:rPr lang="en-US" dirty="0" smtClean="0">
-                <a:hlinkClick r:id="rId7"/>
-              </a:rPr>
-              <a:t>/</a:t>
-            </a:r>
-            <a:endParaRPr lang="en-US" dirty="0" smtClean="0"/>
-          </a:p>
-          <a:p>
-            <a:r>
-              <a:rPr lang="en-US" dirty="0" smtClean="0"/>
-              <a:t>Twitter - </a:t>
-            </a:r>
-            <a:r>
-              <a:rPr lang="en-US" dirty="0" smtClean="0">
-                <a:hlinkClick r:id="rId8"/>
-              </a:rPr>
-              <a:t>https</a:t>
-            </a:r>
-            <a:r>
-              <a:rPr lang="en-US" dirty="0">
-                <a:hlinkClick r:id="rId8"/>
-              </a:rPr>
-              <a:t>://</a:t>
-            </a:r>
-            <a:r>
-              <a:rPr lang="en-US" dirty="0" smtClean="0">
-                <a:hlinkClick r:id="rId8"/>
-              </a:rPr>
-              <a:t>twitter.com/phpstorm</a:t>
-            </a:r>
-            <a:endParaRPr lang="nl-BE" dirty="0"/>
-          </a:p>
-        </p:txBody>
-      </p:sp>
+        </p:txBody>
+      </p:sp>
+      <p:sp>
+        <p:nvSpPr>
+          <p:cNvPr id="16" name="TextBox 15"/>
+          <p:cNvSpPr txBox="1"/>
+          <p:nvPr/>
+        </p:nvSpPr>
+        <p:spPr>
+          <a:xfrm>
+            <a:off x="1398095" y="5011199"/>
+            <a:ext cx="1152944" cy="338554"/>
+          </a:xfrm>
+          <a:prstGeom prst="rect">
+            <a:avLst/>
+          </a:prstGeom>
+          <a:noFill/>
+        </p:spPr>
+        <p:txBody>
+          <a:bodyPr wrap="none" rtlCol="0">
+            <a:spAutoFit/>
+          </a:bodyPr>
+          <a:lstStyle/>
+          <a:p>
+            <a:r>
+              <a:rPr lang="nl-BE" sz="1600" dirty="0" smtClean="0"/>
+              <a:t>Ctrl+Shift+X</a:t>
+            </a:r>
+            <a:endParaRPr lang="nl-BE" sz="1600" dirty="0"/>
+          </a:p>
+        </p:txBody>
+      </p:sp>
+      <p:sp>
+        <p:nvSpPr>
+          <p:cNvPr id="17" name="TextBox 16"/>
+          <p:cNvSpPr txBox="1"/>
+          <p:nvPr/>
+        </p:nvSpPr>
+        <p:spPr>
+          <a:xfrm>
+            <a:off x="1398095" y="5408377"/>
+            <a:ext cx="1748556" cy="338554"/>
+          </a:xfrm>
+          <a:prstGeom prst="rect">
+            <a:avLst/>
+          </a:prstGeom>
+          <a:noFill/>
+        </p:spPr>
+        <p:txBody>
+          <a:bodyPr wrap="none" rtlCol="0">
+            <a:spAutoFit/>
+          </a:bodyPr>
+          <a:lstStyle/>
+          <a:p>
+            <a:r>
+              <a:rPr lang="nl-BE" sz="1600" dirty="0" smtClean="0"/>
+              <a:t>Command+Shift+X</a:t>
+            </a:r>
+            <a:endParaRPr lang="nl-BE" sz="1600" dirty="0"/>
+          </a:p>
+        </p:txBody>
+      </p:sp>
+      <p:pic>
+        <p:nvPicPr>
+          <p:cNvPr id="18" name="Picture 17"/>
+          <p:cNvPicPr>
+            <a:picLocks noChangeAspect="1"/>
+          </p:cNvPicPr>
+          <p:nvPr/>
+        </p:nvPicPr>
+        <p:blipFill rotWithShape="1">
+          <a:blip r:embed="rId2"/>
+          <a:srcRect r="38380"/>
+          <a:stretch/>
+        </p:blipFill>
+        <p:spPr>
+          <a:xfrm>
+            <a:off x="738435" y="4994238"/>
+            <a:ext cx="671813" cy="355515"/>
+          </a:xfrm>
+          <a:prstGeom prst="rect">
+            <a:avLst/>
+          </a:prstGeom>
+        </p:spPr>
+      </p:pic>
+      <p:pic>
+        <p:nvPicPr>
+          <p:cNvPr id="19" name="Picture 18"/>
+          <p:cNvPicPr>
+            <a:picLocks noChangeAspect="1"/>
+          </p:cNvPicPr>
+          <p:nvPr/>
+        </p:nvPicPr>
+        <p:blipFill rotWithShape="1">
+          <a:blip r:embed="rId2"/>
+          <a:srcRect l="67484" t="-15573" b="-1"/>
+          <a:stretch/>
+        </p:blipFill>
+        <p:spPr>
+          <a:xfrm>
+            <a:off x="1055742" y="5354581"/>
+            <a:ext cx="354506" cy="410881"/>
+          </a:xfrm>
+          <a:prstGeom prst="rect">
+            <a:avLst/>
+          </a:prstGeom>
+        </p:spPr>
+      </p:pic>
+      <p:pic>
+        <p:nvPicPr>
+          <p:cNvPr id="6" name="Content Placeholder 5"/>
+          <p:cNvPicPr>
+            <a:picLocks noGrp="1" noChangeAspect="1"/>
+          </p:cNvPicPr>
+          <p:nvPr>
+            <p:ph sz="half" idx="2"/>
+          </p:nvPr>
+        </p:nvPicPr>
+        <p:blipFill>
+          <a:blip r:embed="rId3"/>
+          <a:stretch>
+            <a:fillRect/>
+          </a:stretch>
+        </p:blipFill>
+        <p:spPr>
+          <a:xfrm>
+            <a:off x="5693870" y="2304501"/>
+            <a:ext cx="5298473" cy="3155460"/>
+          </a:xfrm>
+          <a:prstGeom prst="rect">
+            <a:avLst/>
+          </a:prstGeom>
+        </p:spPr>
+      </p:pic>
     </p:spTree>
     <p:extLst>
       <p:ext uri="{BB962C8B-B14F-4D97-AF65-F5344CB8AC3E}">
-        <p14:creationId xmlns:p14="http://schemas.microsoft.com/office/powerpoint/2010/main" val="3169142718"/>
+        <p14:creationId xmlns:p14="http://schemas.microsoft.com/office/powerpoint/2010/main" val="4195197920"/>
       </p:ext>
     </p:extLst>
   </p:cSld>
@@ -9087,16 +9117,1116 @@
           <a:chExt cx="0" cy="0"/>
         </a:xfrm>
       </p:grpSpPr>
+      <p:sp>
+        <p:nvSpPr>
+          <p:cNvPr id="4" name="Title 3"/>
+          <p:cNvSpPr>
+            <a:spLocks noGrp="1"/>
+          </p:cNvSpPr>
+          <p:nvPr>
+            <p:ph type="title"/>
+          </p:nvPr>
+        </p:nvSpPr>
+        <p:spPr/>
+        <p:txBody>
+          <a:bodyPr>
+            <a:normAutofit/>
+          </a:bodyPr>
+          <a:lstStyle/>
+          <a:p>
+            <a:r>
+              <a:rPr lang="nl-BE" dirty="0" smtClean="0"/>
+              <a:t>Vagrant</a:t>
+            </a:r>
+            <a:endParaRPr lang="nl-BE" dirty="0"/>
+          </a:p>
+        </p:txBody>
+      </p:sp>
+      <p:sp>
+        <p:nvSpPr>
+          <p:cNvPr id="5" name="Content Placeholder 4"/>
+          <p:cNvSpPr>
+            <a:spLocks noGrp="1"/>
+          </p:cNvSpPr>
+          <p:nvPr>
+            <p:ph sz="half" idx="1"/>
+          </p:nvPr>
+        </p:nvSpPr>
+        <p:spPr/>
+        <p:txBody>
+          <a:bodyPr/>
+          <a:lstStyle/>
+          <a:p>
+            <a:r>
+              <a:rPr lang="en-US" dirty="0" smtClean="0"/>
+              <a:t>Vagrant is a tool which helps us create reproducible development environments by scripting a virtual machine.</a:t>
+            </a:r>
+          </a:p>
+          <a:p>
+            <a:r>
+              <a:rPr lang="en-US" dirty="0" smtClean="0"/>
+              <a:t>See </a:t>
+            </a:r>
+            <a:r>
+              <a:rPr lang="en-US" dirty="0" smtClean="0">
+                <a:hlinkClick r:id="rId2"/>
+              </a:rPr>
+              <a:t>http://blog.jetbrains.com/phpstorm/2013/08/vagrant-support-in-phpstorm/</a:t>
+            </a:r>
+            <a:r>
+              <a:rPr lang="en-US" dirty="0" smtClean="0"/>
+              <a:t> </a:t>
+            </a:r>
+            <a:endParaRPr lang="en-US" dirty="0"/>
+          </a:p>
+        </p:txBody>
+      </p:sp>
+      <p:pic>
+        <p:nvPicPr>
+          <p:cNvPr id="7" name="Content Placeholder 6"/>
+          <p:cNvPicPr>
+            <a:picLocks noGrp="1" noChangeAspect="1"/>
+          </p:cNvPicPr>
+          <p:nvPr>
+            <p:ph sz="half" idx="2"/>
+          </p:nvPr>
+        </p:nvPicPr>
+        <p:blipFill>
+          <a:blip r:embed="rId3"/>
+          <a:stretch>
+            <a:fillRect/>
+          </a:stretch>
+        </p:blipFill>
+        <p:spPr>
+          <a:xfrm>
+            <a:off x="5503285" y="953823"/>
+            <a:ext cx="5679643" cy="4918977"/>
+          </a:xfrm>
+          <a:prstGeom prst="rect">
+            <a:avLst/>
+          </a:prstGeom>
+        </p:spPr>
+      </p:pic>
     </p:spTree>
     <p:extLst>
       <p:ext uri="{BB962C8B-B14F-4D97-AF65-F5344CB8AC3E}">
-        <p14:creationId xmlns:p14="http://schemas.microsoft.com/office/powerpoint/2010/main" val="618802910"/>
+        <p14:creationId xmlns:p14="http://schemas.microsoft.com/office/powerpoint/2010/main" val="3637503624"/>
       </p:ext>
     </p:extLst>
   </p:cSld>
   <p:clrMapOvr>
     <a:masterClrMapping/>
   </p:clrMapOvr>
+</p:sld>
+</file>
+
+<file path=ppt/slides/slide123.xml><?xml version="1.0" encoding="utf-8"?>
+<p:sld xmlns:a="http://schemas.openxmlformats.org/drawingml/2006/main" xmlns:r="http://schemas.openxmlformats.org/officeDocument/2006/relationships" xmlns:p="http://schemas.openxmlformats.org/presentationml/2006/main">
+  <p:cSld>
+    <p:spTree>
+      <p:nvGrpSpPr>
+        <p:cNvPr id="1" name=""/>
+        <p:cNvGrpSpPr/>
+        <p:nvPr/>
+      </p:nvGrpSpPr>
+      <p:grpSpPr>
+        <a:xfrm>
+          <a:off x="0" y="0"/>
+          <a:ext cx="0" cy="0"/>
+          <a:chOff x="0" y="0"/>
+          <a:chExt cx="0" cy="0"/>
+        </a:xfrm>
+      </p:grpSpPr>
+      <p:sp>
+        <p:nvSpPr>
+          <p:cNvPr id="4" name="Title 3"/>
+          <p:cNvSpPr>
+            <a:spLocks noGrp="1"/>
+          </p:cNvSpPr>
+          <p:nvPr>
+            <p:ph type="title"/>
+          </p:nvPr>
+        </p:nvSpPr>
+        <p:spPr/>
+        <p:txBody>
+          <a:bodyPr>
+            <a:normAutofit/>
+          </a:bodyPr>
+          <a:lstStyle/>
+          <a:p>
+            <a:r>
+              <a:rPr lang="nl-BE" dirty="0" smtClean="0"/>
+              <a:t>Remote SSH Terminal</a:t>
+            </a:r>
+            <a:endParaRPr lang="nl-BE" dirty="0"/>
+          </a:p>
+        </p:txBody>
+      </p:sp>
+      <p:sp>
+        <p:nvSpPr>
+          <p:cNvPr id="5" name="Content Placeholder 4"/>
+          <p:cNvSpPr>
+            <a:spLocks noGrp="1"/>
+          </p:cNvSpPr>
+          <p:nvPr>
+            <p:ph sz="half" idx="1"/>
+          </p:nvPr>
+        </p:nvSpPr>
+        <p:spPr/>
+        <p:txBody>
+          <a:bodyPr/>
+          <a:lstStyle/>
+          <a:p>
+            <a:r>
+              <a:rPr lang="en-US" dirty="0" smtClean="0"/>
+              <a:t>Connect to a remote SSH server. Provides a full SSH terminal in the IDE.</a:t>
+            </a:r>
+            <a:endParaRPr lang="en-US" dirty="0"/>
+          </a:p>
+        </p:txBody>
+      </p:sp>
+      <p:pic>
+        <p:nvPicPr>
+          <p:cNvPr id="6" name="Content Placeholder 5"/>
+          <p:cNvPicPr>
+            <a:picLocks noGrp="1" noChangeAspect="1"/>
+          </p:cNvPicPr>
+          <p:nvPr>
+            <p:ph sz="half" idx="2"/>
+          </p:nvPr>
+        </p:nvPicPr>
+        <p:blipFill>
+          <a:blip r:embed="rId2"/>
+          <a:stretch>
+            <a:fillRect/>
+          </a:stretch>
+        </p:blipFill>
+        <p:spPr>
+          <a:xfrm>
+            <a:off x="4929932" y="3008438"/>
+            <a:ext cx="6826348" cy="2732318"/>
+          </a:xfrm>
+          <a:prstGeom prst="rect">
+            <a:avLst/>
+          </a:prstGeom>
+        </p:spPr>
+      </p:pic>
+    </p:spTree>
+    <p:extLst>
+      <p:ext uri="{BB962C8B-B14F-4D97-AF65-F5344CB8AC3E}">
+        <p14:creationId xmlns:p14="http://schemas.microsoft.com/office/powerpoint/2010/main" val="1553238785"/>
+      </p:ext>
+    </p:extLst>
+  </p:cSld>
+  <p:clrMapOvr>
+    <a:masterClrMapping/>
+  </p:clrMapOvr>
+</p:sld>
+</file>
+
+<file path=ppt/slides/slide124.xml><?xml version="1.0" encoding="utf-8"?>
+<p:sld xmlns:a="http://schemas.openxmlformats.org/drawingml/2006/main" xmlns:r="http://schemas.openxmlformats.org/officeDocument/2006/relationships" xmlns:p="http://schemas.openxmlformats.org/presentationml/2006/main">
+  <p:cSld>
+    <p:spTree>
+      <p:nvGrpSpPr>
+        <p:cNvPr id="1" name=""/>
+        <p:cNvGrpSpPr/>
+        <p:nvPr/>
+      </p:nvGrpSpPr>
+      <p:grpSpPr>
+        <a:xfrm>
+          <a:off x="0" y="0"/>
+          <a:ext cx="0" cy="0"/>
+          <a:chOff x="0" y="0"/>
+          <a:chExt cx="0" cy="0"/>
+        </a:xfrm>
+      </p:grpSpPr>
+      <p:sp>
+        <p:nvSpPr>
+          <p:cNvPr id="4" name="Title 3"/>
+          <p:cNvSpPr>
+            <a:spLocks noGrp="1"/>
+          </p:cNvSpPr>
+          <p:nvPr>
+            <p:ph type="title"/>
+          </p:nvPr>
+        </p:nvSpPr>
+        <p:spPr/>
+        <p:txBody>
+          <a:bodyPr>
+            <a:normAutofit/>
+          </a:bodyPr>
+          <a:lstStyle/>
+          <a:p>
+            <a:r>
+              <a:rPr lang="nl-BE" dirty="0" smtClean="0"/>
+              <a:t>Local Terminal</a:t>
+            </a:r>
+            <a:endParaRPr lang="nl-BE" dirty="0"/>
+          </a:p>
+        </p:txBody>
+      </p:sp>
+      <p:sp>
+        <p:nvSpPr>
+          <p:cNvPr id="5" name="Content Placeholder 4"/>
+          <p:cNvSpPr>
+            <a:spLocks noGrp="1"/>
+          </p:cNvSpPr>
+          <p:nvPr>
+            <p:ph sz="half" idx="1"/>
+          </p:nvPr>
+        </p:nvSpPr>
+        <p:spPr/>
+        <p:txBody>
+          <a:bodyPr/>
+          <a:lstStyle/>
+          <a:p>
+            <a:r>
+              <a:rPr lang="en-US" dirty="0" smtClean="0"/>
+              <a:t>Provide a local terminal. Works on any platform supported by PhpStorm.</a:t>
+            </a:r>
+            <a:endParaRPr lang="en-US" dirty="0"/>
+          </a:p>
+        </p:txBody>
+      </p:sp>
+      <p:sp>
+        <p:nvSpPr>
+          <p:cNvPr id="16" name="TextBox 15"/>
+          <p:cNvSpPr txBox="1"/>
+          <p:nvPr/>
+        </p:nvSpPr>
+        <p:spPr>
+          <a:xfrm>
+            <a:off x="1398095" y="5011199"/>
+            <a:ext cx="2532616" cy="338554"/>
+          </a:xfrm>
+          <a:prstGeom prst="rect">
+            <a:avLst/>
+          </a:prstGeom>
+          <a:noFill/>
+        </p:spPr>
+        <p:txBody>
+          <a:bodyPr wrap="none" rtlCol="0">
+            <a:spAutoFit/>
+          </a:bodyPr>
+          <a:lstStyle/>
+          <a:p>
+            <a:r>
+              <a:rPr lang="nl-BE" sz="1600" dirty="0" smtClean="0"/>
+              <a:t>Ctrl+Space / Ctrl+Shift+Space</a:t>
+            </a:r>
+            <a:endParaRPr lang="nl-BE" sz="1600" dirty="0"/>
+          </a:p>
+        </p:txBody>
+      </p:sp>
+      <p:sp>
+        <p:nvSpPr>
+          <p:cNvPr id="17" name="TextBox 16"/>
+          <p:cNvSpPr txBox="1"/>
+          <p:nvPr/>
+        </p:nvSpPr>
+        <p:spPr>
+          <a:xfrm>
+            <a:off x="1398095" y="5408377"/>
+            <a:ext cx="2532616" cy="338554"/>
+          </a:xfrm>
+          <a:prstGeom prst="rect">
+            <a:avLst/>
+          </a:prstGeom>
+          <a:noFill/>
+        </p:spPr>
+        <p:txBody>
+          <a:bodyPr wrap="none" rtlCol="0">
+            <a:spAutoFit/>
+          </a:bodyPr>
+          <a:lstStyle/>
+          <a:p>
+            <a:r>
+              <a:rPr lang="nl-BE" sz="1600" dirty="0"/>
+              <a:t>Ctrl+Space / Ctrl+Shift+Space</a:t>
+            </a:r>
+          </a:p>
+        </p:txBody>
+      </p:sp>
+      <p:pic>
+        <p:nvPicPr>
+          <p:cNvPr id="18" name="Picture 17"/>
+          <p:cNvPicPr>
+            <a:picLocks noChangeAspect="1"/>
+          </p:cNvPicPr>
+          <p:nvPr/>
+        </p:nvPicPr>
+        <p:blipFill rotWithShape="1">
+          <a:blip r:embed="rId2"/>
+          <a:srcRect r="38380"/>
+          <a:stretch/>
+        </p:blipFill>
+        <p:spPr>
+          <a:xfrm>
+            <a:off x="738435" y="4994238"/>
+            <a:ext cx="671813" cy="355515"/>
+          </a:xfrm>
+          <a:prstGeom prst="rect">
+            <a:avLst/>
+          </a:prstGeom>
+        </p:spPr>
+      </p:pic>
+      <p:pic>
+        <p:nvPicPr>
+          <p:cNvPr id="19" name="Picture 18"/>
+          <p:cNvPicPr>
+            <a:picLocks noChangeAspect="1"/>
+          </p:cNvPicPr>
+          <p:nvPr/>
+        </p:nvPicPr>
+        <p:blipFill rotWithShape="1">
+          <a:blip r:embed="rId2"/>
+          <a:srcRect l="67484" t="-15573" b="-1"/>
+          <a:stretch/>
+        </p:blipFill>
+        <p:spPr>
+          <a:xfrm>
+            <a:off x="1055742" y="5354581"/>
+            <a:ext cx="354506" cy="410881"/>
+          </a:xfrm>
+          <a:prstGeom prst="rect">
+            <a:avLst/>
+          </a:prstGeom>
+        </p:spPr>
+      </p:pic>
+      <p:pic>
+        <p:nvPicPr>
+          <p:cNvPr id="6" name="Content Placeholder 5"/>
+          <p:cNvPicPr>
+            <a:picLocks noGrp="1" noChangeAspect="1"/>
+          </p:cNvPicPr>
+          <p:nvPr>
+            <p:ph sz="half" idx="2"/>
+          </p:nvPr>
+        </p:nvPicPr>
+        <p:blipFill>
+          <a:blip r:embed="rId3"/>
+          <a:stretch>
+            <a:fillRect/>
+          </a:stretch>
+        </p:blipFill>
+        <p:spPr>
+          <a:xfrm>
+            <a:off x="4929932" y="2516072"/>
+            <a:ext cx="6826348" cy="2732318"/>
+          </a:xfrm>
+          <a:prstGeom prst="rect">
+            <a:avLst/>
+          </a:prstGeom>
+        </p:spPr>
+      </p:pic>
+    </p:spTree>
+    <p:extLst>
+      <p:ext uri="{BB962C8B-B14F-4D97-AF65-F5344CB8AC3E}">
+        <p14:creationId xmlns:p14="http://schemas.microsoft.com/office/powerpoint/2010/main" val="4021696331"/>
+      </p:ext>
+    </p:extLst>
+  </p:cSld>
+  <p:clrMapOvr>
+    <a:masterClrMapping/>
+  </p:clrMapOvr>
+</p:sld>
+</file>
+
+<file path=ppt/slides/slide125.xml><?xml version="1.0" encoding="utf-8"?>
+<p:sld xmlns:a="http://schemas.openxmlformats.org/drawingml/2006/main" xmlns:r="http://schemas.openxmlformats.org/officeDocument/2006/relationships" xmlns:p="http://schemas.openxmlformats.org/presentationml/2006/main">
+  <p:cSld>
+    <p:spTree>
+      <p:nvGrpSpPr>
+        <p:cNvPr id="1" name=""/>
+        <p:cNvGrpSpPr/>
+        <p:nvPr/>
+      </p:nvGrpSpPr>
+      <p:grpSpPr>
+        <a:xfrm>
+          <a:off x="0" y="0"/>
+          <a:ext cx="0" cy="0"/>
+          <a:chOff x="0" y="0"/>
+          <a:chExt cx="0" cy="0"/>
+        </a:xfrm>
+      </p:grpSpPr>
+      <p:sp>
+        <p:nvSpPr>
+          <p:cNvPr id="4" name="Title 3"/>
+          <p:cNvSpPr>
+            <a:spLocks noGrp="1"/>
+          </p:cNvSpPr>
+          <p:nvPr>
+            <p:ph type="ctrTitle"/>
+          </p:nvPr>
+        </p:nvSpPr>
+        <p:spPr/>
+        <p:txBody>
+          <a:bodyPr/>
+          <a:lstStyle/>
+          <a:p>
+            <a:r>
+              <a:rPr lang="nl-BE" dirty="0" smtClean="0"/>
+              <a:t>Plugins</a:t>
+            </a:r>
+            <a:endParaRPr lang="nl-BE" dirty="0"/>
+          </a:p>
+        </p:txBody>
+      </p:sp>
+      <p:sp>
+        <p:nvSpPr>
+          <p:cNvPr id="5" name="Subtitle 4"/>
+          <p:cNvSpPr>
+            <a:spLocks noGrp="1"/>
+          </p:cNvSpPr>
+          <p:nvPr>
+            <p:ph type="subTitle" idx="1"/>
+          </p:nvPr>
+        </p:nvSpPr>
+        <p:spPr/>
+        <p:txBody>
+          <a:bodyPr/>
+          <a:lstStyle/>
+          <a:p>
+            <a:endParaRPr lang="nl-BE"/>
+          </a:p>
+        </p:txBody>
+      </p:sp>
+    </p:spTree>
+    <p:extLst>
+      <p:ext uri="{BB962C8B-B14F-4D97-AF65-F5344CB8AC3E}">
+        <p14:creationId xmlns:p14="http://schemas.microsoft.com/office/powerpoint/2010/main" val="1579485310"/>
+      </p:ext>
+    </p:extLst>
+  </p:cSld>
+  <p:clrMapOvr>
+    <a:masterClrMapping/>
+  </p:clrMapOvr>
+  <p:timing>
+    <p:tnLst>
+      <p:par>
+        <p:cTn id="1" dur="indefinite" restart="never" nodeType="tmRoot"/>
+      </p:par>
+    </p:tnLst>
+  </p:timing>
+</p:sld>
+</file>
+
+<file path=ppt/slides/slide126.xml><?xml version="1.0" encoding="utf-8"?>
+<p:sld xmlns:a="http://schemas.openxmlformats.org/drawingml/2006/main" xmlns:r="http://schemas.openxmlformats.org/officeDocument/2006/relationships" xmlns:p="http://schemas.openxmlformats.org/presentationml/2006/main">
+  <p:cSld>
+    <p:spTree>
+      <p:nvGrpSpPr>
+        <p:cNvPr id="1" name=""/>
+        <p:cNvGrpSpPr/>
+        <p:nvPr/>
+      </p:nvGrpSpPr>
+      <p:grpSpPr>
+        <a:xfrm>
+          <a:off x="0" y="0"/>
+          <a:ext cx="0" cy="0"/>
+          <a:chOff x="0" y="0"/>
+          <a:chExt cx="0" cy="0"/>
+        </a:xfrm>
+      </p:grpSpPr>
+      <p:sp>
+        <p:nvSpPr>
+          <p:cNvPr id="4" name="Title 3"/>
+          <p:cNvSpPr>
+            <a:spLocks noGrp="1"/>
+          </p:cNvSpPr>
+          <p:nvPr>
+            <p:ph type="title"/>
+          </p:nvPr>
+        </p:nvSpPr>
+        <p:spPr/>
+        <p:txBody>
+          <a:bodyPr/>
+          <a:lstStyle/>
+          <a:p>
+            <a:r>
+              <a:rPr lang="nl-BE" dirty="0" smtClean="0"/>
+              <a:t>PhpStorm = IntelliJ IDEA + plugins</a:t>
+            </a:r>
+            <a:endParaRPr lang="nl-BE" dirty="0"/>
+          </a:p>
+        </p:txBody>
+      </p:sp>
+      <p:sp>
+        <p:nvSpPr>
+          <p:cNvPr id="5" name="Content Placeholder 4"/>
+          <p:cNvSpPr>
+            <a:spLocks noGrp="1"/>
+          </p:cNvSpPr>
+          <p:nvPr>
+            <p:ph idx="1"/>
+          </p:nvPr>
+        </p:nvSpPr>
+        <p:spPr/>
+        <p:txBody>
+          <a:bodyPr>
+            <a:normAutofit/>
+          </a:bodyPr>
+          <a:lstStyle/>
+          <a:p>
+            <a:r>
+              <a:rPr lang="nl-BE" dirty="0" smtClean="0"/>
+              <a:t>Base IDE enriched with plugins</a:t>
+            </a:r>
+          </a:p>
+          <a:p>
+            <a:r>
+              <a:rPr lang="nl-BE" dirty="0" smtClean="0"/>
+              <a:t>Some plugins are for paid IDE only</a:t>
+            </a:r>
+          </a:p>
+          <a:p>
+            <a:pPr lvl="1"/>
+            <a:r>
+              <a:rPr lang="nl-BE" dirty="0" smtClean="0"/>
+              <a:t>Which is cool: WebStorm features can be installed in PhpStorm</a:t>
+            </a:r>
+          </a:p>
+          <a:p>
+            <a:r>
+              <a:rPr lang="nl-BE" dirty="0"/>
+              <a:t>A lot of free / open source plugins at </a:t>
+            </a:r>
+            <a:r>
+              <a:rPr lang="nl-BE" dirty="0">
+                <a:hlinkClick r:id="rId2"/>
+              </a:rPr>
+              <a:t>http://plugins.jetbrains.com/?</a:t>
+            </a:r>
+            <a:r>
+              <a:rPr lang="nl-BE" dirty="0" smtClean="0">
+                <a:hlinkClick r:id="rId2"/>
+              </a:rPr>
+              <a:t>phpStorm</a:t>
+            </a:r>
+            <a:endParaRPr lang="nl-BE" dirty="0" smtClean="0"/>
+          </a:p>
+          <a:p>
+            <a:r>
+              <a:rPr lang="nl-BE" dirty="0" smtClean="0"/>
+              <a:t>Install from </a:t>
+            </a:r>
+            <a:r>
+              <a:rPr lang="nl-BE" b="1" dirty="0" smtClean="0"/>
+              <a:t>IDE Settings | Plugins</a:t>
+            </a:r>
+          </a:p>
+          <a:p>
+            <a:endParaRPr lang="nl-BE" dirty="0"/>
+          </a:p>
+        </p:txBody>
+      </p:sp>
+      <p:pic>
+        <p:nvPicPr>
+          <p:cNvPr id="3" name="Picture 2"/>
+          <p:cNvPicPr>
+            <a:picLocks noChangeAspect="1"/>
+          </p:cNvPicPr>
+          <p:nvPr/>
+        </p:nvPicPr>
+        <p:blipFill>
+          <a:blip r:embed="rId3"/>
+          <a:stretch>
+            <a:fillRect/>
+          </a:stretch>
+        </p:blipFill>
+        <p:spPr>
+          <a:xfrm rot="20986544">
+            <a:off x="5013122" y="4255475"/>
+            <a:ext cx="7682969" cy="3948112"/>
+          </a:xfrm>
+          <a:prstGeom prst="rect">
+            <a:avLst/>
+          </a:prstGeom>
+          <a:ln>
+            <a:noFill/>
+          </a:ln>
+          <a:effectLst>
+            <a:outerShdw blurRad="292100" dist="139700" dir="2700000" algn="tl" rotWithShape="0">
+              <a:srgbClr val="333333">
+                <a:alpha val="65000"/>
+              </a:srgbClr>
+            </a:outerShdw>
+          </a:effectLst>
+        </p:spPr>
+      </p:pic>
+    </p:spTree>
+    <p:extLst>
+      <p:ext uri="{BB962C8B-B14F-4D97-AF65-F5344CB8AC3E}">
+        <p14:creationId xmlns:p14="http://schemas.microsoft.com/office/powerpoint/2010/main" val="1444663145"/>
+      </p:ext>
+    </p:extLst>
+  </p:cSld>
+  <p:clrMapOvr>
+    <a:masterClrMapping/>
+  </p:clrMapOvr>
+  <p:timing>
+    <p:tnLst>
+      <p:par>
+        <p:cTn id="1" dur="indefinite" restart="never" nodeType="tmRoot"/>
+      </p:par>
+    </p:tnLst>
+  </p:timing>
+</p:sld>
+</file>
+
+<file path=ppt/slides/slide127.xml><?xml version="1.0" encoding="utf-8"?>
+<p:sld xmlns:a="http://schemas.openxmlformats.org/drawingml/2006/main" xmlns:r="http://schemas.openxmlformats.org/officeDocument/2006/relationships" xmlns:p="http://schemas.openxmlformats.org/presentationml/2006/main">
+  <p:cSld>
+    <p:spTree>
+      <p:nvGrpSpPr>
+        <p:cNvPr id="1" name=""/>
+        <p:cNvGrpSpPr/>
+        <p:nvPr/>
+      </p:nvGrpSpPr>
+      <p:grpSpPr>
+        <a:xfrm>
+          <a:off x="0" y="0"/>
+          <a:ext cx="0" cy="0"/>
+          <a:chOff x="0" y="0"/>
+          <a:chExt cx="0" cy="0"/>
+        </a:xfrm>
+      </p:grpSpPr>
+      <p:sp>
+        <p:nvSpPr>
+          <p:cNvPr id="4" name="Title 3"/>
+          <p:cNvSpPr>
+            <a:spLocks noGrp="1"/>
+          </p:cNvSpPr>
+          <p:nvPr>
+            <p:ph type="title"/>
+          </p:nvPr>
+        </p:nvSpPr>
+        <p:spPr/>
+        <p:txBody>
+          <a:bodyPr/>
+          <a:lstStyle/>
+          <a:p>
+            <a:r>
+              <a:rPr lang="nl-BE" dirty="0" smtClean="0"/>
+              <a:t>Some interesting JetBrains plugins</a:t>
+            </a:r>
+            <a:endParaRPr lang="nl-BE" dirty="0"/>
+          </a:p>
+        </p:txBody>
+      </p:sp>
+      <p:sp>
+        <p:nvSpPr>
+          <p:cNvPr id="5" name="Content Placeholder 4"/>
+          <p:cNvSpPr>
+            <a:spLocks noGrp="1"/>
+          </p:cNvSpPr>
+          <p:nvPr>
+            <p:ph idx="1"/>
+          </p:nvPr>
+        </p:nvSpPr>
+        <p:spPr/>
+        <p:txBody>
+          <a:bodyPr>
+            <a:normAutofit/>
+          </a:bodyPr>
+          <a:lstStyle/>
+          <a:p>
+            <a:r>
+              <a:rPr lang="nl-BE" dirty="0"/>
+              <a:t>Handlebars/Mustache and EJS </a:t>
+            </a:r>
+            <a:r>
+              <a:rPr lang="nl-BE" dirty="0">
+                <a:solidFill>
+                  <a:schemeClr val="accent2"/>
+                </a:solidFill>
+              </a:rPr>
+              <a:t>- plugins for working with client-side template engines</a:t>
+            </a:r>
+          </a:p>
+          <a:p>
+            <a:r>
+              <a:rPr lang="nl-BE" dirty="0"/>
+              <a:t>JSTestDriver and Karma </a:t>
+            </a:r>
+            <a:r>
+              <a:rPr lang="nl-BE" dirty="0">
+                <a:solidFill>
+                  <a:schemeClr val="accent2"/>
+                </a:solidFill>
+              </a:rPr>
+              <a:t>- run JavaScript unit tests</a:t>
+            </a:r>
+          </a:p>
+          <a:p>
+            <a:r>
+              <a:rPr lang="nl-BE" dirty="0"/>
+              <a:t>LiveEdit </a:t>
+            </a:r>
+            <a:r>
+              <a:rPr lang="nl-BE" dirty="0">
+                <a:solidFill>
+                  <a:schemeClr val="accent2"/>
+                </a:solidFill>
+              </a:rPr>
+              <a:t>- view changes live in browser and vice-versa</a:t>
+            </a:r>
+          </a:p>
+          <a:p>
+            <a:r>
+              <a:rPr lang="nl-BE" dirty="0"/>
+              <a:t>NodeJS </a:t>
+            </a:r>
+            <a:r>
+              <a:rPr lang="nl-BE" dirty="0">
+                <a:solidFill>
+                  <a:schemeClr val="accent2"/>
+                </a:solidFill>
+              </a:rPr>
+              <a:t>- install Node.js packages (NPM) in a similar way to Composer</a:t>
+            </a:r>
+          </a:p>
+          <a:p>
+            <a:r>
+              <a:rPr lang="nl-BE" dirty="0"/>
+              <a:t>Puppet Support </a:t>
+            </a:r>
+            <a:r>
+              <a:rPr lang="nl-BE" dirty="0">
+                <a:solidFill>
+                  <a:schemeClr val="accent2"/>
+                </a:solidFill>
+              </a:rPr>
+              <a:t>- provides editor support for puppet, very conventient with Vagrant</a:t>
+            </a:r>
+          </a:p>
+          <a:p>
+            <a:r>
+              <a:rPr lang="nl-BE" dirty="0"/>
+              <a:t>IdeaVim </a:t>
+            </a:r>
+            <a:r>
+              <a:rPr lang="nl-BE" dirty="0">
+                <a:solidFill>
+                  <a:schemeClr val="accent2"/>
+                </a:solidFill>
+              </a:rPr>
+              <a:t>- adds VIM capabilities to the </a:t>
+            </a:r>
+            <a:r>
+              <a:rPr lang="nl-BE" dirty="0" smtClean="0">
+                <a:solidFill>
+                  <a:schemeClr val="accent2"/>
+                </a:solidFill>
+              </a:rPr>
+              <a:t>IDE</a:t>
+            </a:r>
+          </a:p>
+          <a:p>
+            <a:r>
+              <a:rPr lang="nl-BE" dirty="0" smtClean="0"/>
+              <a:t>...</a:t>
+            </a:r>
+            <a:endParaRPr lang="nl-BE" dirty="0"/>
+          </a:p>
+        </p:txBody>
+      </p:sp>
+    </p:spTree>
+    <p:extLst>
+      <p:ext uri="{BB962C8B-B14F-4D97-AF65-F5344CB8AC3E}">
+        <p14:creationId xmlns:p14="http://schemas.microsoft.com/office/powerpoint/2010/main" val="2939606340"/>
+      </p:ext>
+    </p:extLst>
+  </p:cSld>
+  <p:clrMapOvr>
+    <a:masterClrMapping/>
+  </p:clrMapOvr>
+  <p:timing>
+    <p:tnLst>
+      <p:par>
+        <p:cTn id="1" dur="indefinite" restart="never" nodeType="tmRoot"/>
+      </p:par>
+    </p:tnLst>
+  </p:timing>
+</p:sld>
+</file>
+
+<file path=ppt/slides/slide128.xml><?xml version="1.0" encoding="utf-8"?>
+<p:sld xmlns:a="http://schemas.openxmlformats.org/drawingml/2006/main" xmlns:r="http://schemas.openxmlformats.org/officeDocument/2006/relationships" xmlns:p="http://schemas.openxmlformats.org/presentationml/2006/main">
+  <p:cSld>
+    <p:spTree>
+      <p:nvGrpSpPr>
+        <p:cNvPr id="1" name=""/>
+        <p:cNvGrpSpPr/>
+        <p:nvPr/>
+      </p:nvGrpSpPr>
+      <p:grpSpPr>
+        <a:xfrm>
+          <a:off x="0" y="0"/>
+          <a:ext cx="0" cy="0"/>
+          <a:chOff x="0" y="0"/>
+          <a:chExt cx="0" cy="0"/>
+        </a:xfrm>
+      </p:grpSpPr>
+      <p:sp>
+        <p:nvSpPr>
+          <p:cNvPr id="4" name="Title 3"/>
+          <p:cNvSpPr>
+            <a:spLocks noGrp="1"/>
+          </p:cNvSpPr>
+          <p:nvPr>
+            <p:ph type="title"/>
+          </p:nvPr>
+        </p:nvSpPr>
+        <p:spPr/>
+        <p:txBody>
+          <a:bodyPr>
+            <a:normAutofit/>
+          </a:bodyPr>
+          <a:lstStyle/>
+          <a:p>
+            <a:r>
+              <a:rPr lang="nl-BE" sz="4800" dirty="0" smtClean="0"/>
+              <a:t>Some interesting open source plugins</a:t>
+            </a:r>
+            <a:endParaRPr lang="nl-BE" sz="4800" dirty="0"/>
+          </a:p>
+        </p:txBody>
+      </p:sp>
+      <p:sp>
+        <p:nvSpPr>
+          <p:cNvPr id="5" name="Content Placeholder 4"/>
+          <p:cNvSpPr>
+            <a:spLocks noGrp="1"/>
+          </p:cNvSpPr>
+          <p:nvPr>
+            <p:ph idx="1"/>
+          </p:nvPr>
+        </p:nvSpPr>
+        <p:spPr/>
+        <p:txBody>
+          <a:bodyPr>
+            <a:normAutofit fontScale="92500" lnSpcReduction="10000"/>
+          </a:bodyPr>
+          <a:lstStyle/>
+          <a:p>
+            <a:r>
+              <a:rPr lang="nl-BE" dirty="0"/>
+              <a:t>'Copy' on steroids </a:t>
+            </a:r>
+            <a:r>
+              <a:rPr lang="nl-BE" dirty="0">
+                <a:solidFill>
+                  <a:schemeClr val="accent2"/>
+                </a:solidFill>
+              </a:rPr>
+              <a:t>- copy rich text from the editor</a:t>
+            </a:r>
+          </a:p>
+          <a:p>
+            <a:r>
+              <a:rPr lang="nl-BE" dirty="0"/>
+              <a:t>Markdown </a:t>
+            </a:r>
+            <a:r>
+              <a:rPr lang="nl-BE" dirty="0">
+                <a:solidFill>
+                  <a:schemeClr val="accent2"/>
+                </a:solidFill>
+              </a:rPr>
+              <a:t>- provides Markdown editor support and syntax highlighting</a:t>
+            </a:r>
+          </a:p>
+          <a:p>
+            <a:r>
+              <a:rPr lang="nl-BE" dirty="0"/>
+              <a:t>BashSupport </a:t>
+            </a:r>
+            <a:r>
+              <a:rPr lang="nl-BE" dirty="0">
+                <a:solidFill>
+                  <a:schemeClr val="accent2"/>
+                </a:solidFill>
+              </a:rPr>
+              <a:t>- support bash files in editor</a:t>
+            </a:r>
+          </a:p>
+          <a:p>
+            <a:r>
+              <a:rPr lang="nl-BE" dirty="0"/>
+              <a:t>AngularJS </a:t>
+            </a:r>
+            <a:r>
+              <a:rPr lang="nl-BE" dirty="0">
+                <a:solidFill>
+                  <a:schemeClr val="accent2"/>
+                </a:solidFill>
+              </a:rPr>
+              <a:t>- support for AngularJS</a:t>
+            </a:r>
+          </a:p>
+          <a:p>
+            <a:r>
+              <a:rPr lang="nl-BE" dirty="0"/>
+              <a:t>Symfony, Yii, CakeStorm, ...</a:t>
+            </a:r>
+            <a:r>
+              <a:rPr lang="nl-BE" dirty="0">
+                <a:solidFill>
+                  <a:schemeClr val="accent2"/>
+                </a:solidFill>
+              </a:rPr>
+              <a:t> - framework-specific plugins</a:t>
+            </a:r>
+          </a:p>
+          <a:p>
+            <a:r>
+              <a:rPr lang="nl-BE" dirty="0"/>
+              <a:t>CodeGlance </a:t>
+            </a:r>
+            <a:r>
+              <a:rPr lang="nl-BE" dirty="0">
+                <a:solidFill>
+                  <a:schemeClr val="accent2"/>
+                </a:solidFill>
+              </a:rPr>
+              <a:t>- the editor scrollbar on steroids</a:t>
+            </a:r>
+          </a:p>
+          <a:p>
+            <a:r>
+              <a:rPr lang="nl-BE" dirty="0"/>
+              <a:t>EditorConfig </a:t>
+            </a:r>
+            <a:r>
+              <a:rPr lang="nl-BE" dirty="0">
+                <a:solidFill>
+                  <a:schemeClr val="accent2"/>
+                </a:solidFill>
+              </a:rPr>
+              <a:t>- support for EditorConfig settings</a:t>
+            </a:r>
+          </a:p>
+          <a:p>
+            <a:r>
+              <a:rPr lang="nl-BE" dirty="0"/>
+              <a:t>Get Gist </a:t>
+            </a:r>
+            <a:r>
+              <a:rPr lang="nl-BE" dirty="0">
+                <a:solidFill>
+                  <a:schemeClr val="accent2"/>
+                </a:solidFill>
+              </a:rPr>
+              <a:t>- fetch a Gist from GitHub and insert it into code</a:t>
+            </a:r>
+          </a:p>
+          <a:p>
+            <a:r>
+              <a:rPr lang="nl-BE" dirty="0"/>
+              <a:t>...</a:t>
+            </a:r>
+            <a:endParaRPr lang="nl-BE" dirty="0"/>
+          </a:p>
+        </p:txBody>
+      </p:sp>
+    </p:spTree>
+    <p:extLst>
+      <p:ext uri="{BB962C8B-B14F-4D97-AF65-F5344CB8AC3E}">
+        <p14:creationId xmlns:p14="http://schemas.microsoft.com/office/powerpoint/2010/main" val="2263626918"/>
+      </p:ext>
+    </p:extLst>
+  </p:cSld>
+  <p:clrMapOvr>
+    <a:masterClrMapping/>
+  </p:clrMapOvr>
+  <p:timing>
+    <p:tnLst>
+      <p:par>
+        <p:cTn id="1" dur="indefinite" restart="never" nodeType="tmRoot"/>
+      </p:par>
+    </p:tnLst>
+  </p:timing>
+</p:sld>
+</file>
+
+<file path=ppt/slides/slide129.xml><?xml version="1.0" encoding="utf-8"?>
+<p:sld xmlns:a="http://schemas.openxmlformats.org/drawingml/2006/main" xmlns:r="http://schemas.openxmlformats.org/officeDocument/2006/relationships" xmlns:p="http://schemas.openxmlformats.org/presentationml/2006/main">
+  <p:cSld>
+    <p:spTree>
+      <p:nvGrpSpPr>
+        <p:cNvPr id="1" name=""/>
+        <p:cNvGrpSpPr/>
+        <p:nvPr/>
+      </p:nvGrpSpPr>
+      <p:grpSpPr>
+        <a:xfrm>
+          <a:off x="0" y="0"/>
+          <a:ext cx="0" cy="0"/>
+          <a:chOff x="0" y="0"/>
+          <a:chExt cx="0" cy="0"/>
+        </a:xfrm>
+      </p:grpSpPr>
+      <p:sp>
+        <p:nvSpPr>
+          <p:cNvPr id="4" name="Title 3"/>
+          <p:cNvSpPr>
+            <a:spLocks noGrp="1"/>
+          </p:cNvSpPr>
+          <p:nvPr>
+            <p:ph type="ctrTitle"/>
+          </p:nvPr>
+        </p:nvSpPr>
+        <p:spPr/>
+        <p:txBody>
+          <a:bodyPr/>
+          <a:lstStyle/>
+          <a:p>
+            <a:r>
+              <a:rPr lang="nl-BE" dirty="0" smtClean="0"/>
+              <a:t>There is much more...</a:t>
+            </a:r>
+            <a:endParaRPr lang="nl-BE" dirty="0"/>
+          </a:p>
+        </p:txBody>
+      </p:sp>
+      <p:sp>
+        <p:nvSpPr>
+          <p:cNvPr id="5" name="Subtitle 4"/>
+          <p:cNvSpPr>
+            <a:spLocks noGrp="1"/>
+          </p:cNvSpPr>
+          <p:nvPr>
+            <p:ph type="subTitle" idx="1"/>
+          </p:nvPr>
+        </p:nvSpPr>
+        <p:spPr/>
+        <p:txBody>
+          <a:bodyPr/>
+          <a:lstStyle/>
+          <a:p>
+            <a:endParaRPr lang="nl-BE"/>
+          </a:p>
+        </p:txBody>
+      </p:sp>
+    </p:spTree>
+    <p:extLst>
+      <p:ext uri="{BB962C8B-B14F-4D97-AF65-F5344CB8AC3E}">
+        <p14:creationId xmlns:p14="http://schemas.microsoft.com/office/powerpoint/2010/main" val="4279494330"/>
+      </p:ext>
+    </p:extLst>
+  </p:cSld>
+  <p:clrMapOvr>
+    <a:masterClrMapping/>
+  </p:clrMapOvr>
+  <p:timing>
+    <p:tnLst>
+      <p:par>
+        <p:cTn id="1" dur="indefinite" restart="never" nodeType="tmRoot"/>
+      </p:par>
+    </p:tnLst>
+  </p:timing>
 </p:sld>
 </file>
 
@@ -9225,6 +10355,545 @@
       </p:par>
     </p:tnLst>
   </p:timing>
+</p:sld>
+</file>
+
+<file path=ppt/slides/slide130.xml><?xml version="1.0" encoding="utf-8"?>
+<p:sld xmlns:a="http://schemas.openxmlformats.org/drawingml/2006/main" xmlns:r="http://schemas.openxmlformats.org/officeDocument/2006/relationships" xmlns:p="http://schemas.openxmlformats.org/presentationml/2006/main">
+  <p:cSld>
+    <p:spTree>
+      <p:nvGrpSpPr>
+        <p:cNvPr id="1" name=""/>
+        <p:cNvGrpSpPr/>
+        <p:nvPr/>
+      </p:nvGrpSpPr>
+      <p:grpSpPr>
+        <a:xfrm>
+          <a:off x="0" y="0"/>
+          <a:ext cx="0" cy="0"/>
+          <a:chOff x="0" y="0"/>
+          <a:chExt cx="0" cy="0"/>
+        </a:xfrm>
+      </p:grpSpPr>
+      <p:sp>
+        <p:nvSpPr>
+          <p:cNvPr id="4" name="Title 3"/>
+          <p:cNvSpPr>
+            <a:spLocks noGrp="1"/>
+          </p:cNvSpPr>
+          <p:nvPr>
+            <p:ph type="title"/>
+          </p:nvPr>
+        </p:nvSpPr>
+        <p:spPr/>
+        <p:txBody>
+          <a:bodyPr/>
+          <a:lstStyle/>
+          <a:p>
+            <a:r>
+              <a:rPr lang="nl-BE" dirty="0" smtClean="0"/>
+              <a:t>What we did not cover...</a:t>
+            </a:r>
+            <a:endParaRPr lang="nl-BE" dirty="0"/>
+          </a:p>
+        </p:txBody>
+      </p:sp>
+      <p:sp>
+        <p:nvSpPr>
+          <p:cNvPr id="5" name="Content Placeholder 4"/>
+          <p:cNvSpPr>
+            <a:spLocks noGrp="1"/>
+          </p:cNvSpPr>
+          <p:nvPr>
+            <p:ph idx="1"/>
+          </p:nvPr>
+        </p:nvSpPr>
+        <p:spPr/>
+        <p:txBody>
+          <a:bodyPr>
+            <a:normAutofit lnSpcReduction="10000"/>
+          </a:bodyPr>
+          <a:lstStyle/>
+          <a:p>
+            <a:r>
+              <a:rPr lang="nl-BE" dirty="0" smtClean="0"/>
+              <a:t>Be sure to t</a:t>
+            </a:r>
+            <a:r>
+              <a:rPr lang="nl-BE" dirty="0" smtClean="0"/>
+              <a:t>ry these afterwards!</a:t>
+            </a:r>
+          </a:p>
+          <a:p>
+            <a:pPr lvl="1"/>
+            <a:r>
+              <a:rPr lang="nl-BE" dirty="0" smtClean="0"/>
+              <a:t>File Watchers – monitor a file and run command when it changes (e.g. LESS to CSS)</a:t>
+            </a:r>
+            <a:endParaRPr lang="nl-BE" dirty="0" smtClean="0"/>
+          </a:p>
+          <a:p>
+            <a:pPr lvl="1"/>
+            <a:r>
+              <a:rPr lang="nl-BE" dirty="0" smtClean="0"/>
+              <a:t>Google App </a:t>
+            </a:r>
+            <a:r>
+              <a:rPr lang="nl-BE" dirty="0" smtClean="0"/>
+              <a:t>Engine – work with GAE development environment and deploy</a:t>
+            </a:r>
+            <a:endParaRPr lang="nl-BE" dirty="0" smtClean="0"/>
+          </a:p>
+          <a:p>
+            <a:pPr lvl="1"/>
+            <a:r>
+              <a:rPr lang="nl-BE" dirty="0" smtClean="0"/>
+              <a:t>Remote Tools / </a:t>
+            </a:r>
+            <a:r>
+              <a:rPr lang="nl-BE" dirty="0" smtClean="0"/>
+              <a:t>Deployment – deploy project to remote server</a:t>
+            </a:r>
+            <a:endParaRPr lang="nl-BE" dirty="0" smtClean="0"/>
+          </a:p>
+          <a:p>
+            <a:pPr lvl="1"/>
+            <a:r>
+              <a:rPr lang="nl-BE" dirty="0" smtClean="0"/>
+              <a:t>Drupal Support – project support, code style, hooks, ...</a:t>
+            </a:r>
+            <a:endParaRPr lang="nl-BE" dirty="0" smtClean="0"/>
+          </a:p>
+          <a:p>
+            <a:pPr lvl="1"/>
+            <a:r>
+              <a:rPr lang="nl-BE" dirty="0" smtClean="0"/>
+              <a:t>Live </a:t>
+            </a:r>
+            <a:r>
+              <a:rPr lang="nl-BE" dirty="0" smtClean="0"/>
+              <a:t>Edit – view changes live in browser and vice-versa</a:t>
+            </a:r>
+            <a:endParaRPr lang="nl-BE" dirty="0" smtClean="0"/>
+          </a:p>
+          <a:p>
+            <a:pPr lvl="1"/>
+            <a:r>
+              <a:rPr lang="nl-BE" dirty="0" smtClean="0"/>
+              <a:t>Issue </a:t>
+            </a:r>
+            <a:r>
+              <a:rPr lang="nl-BE" dirty="0" smtClean="0"/>
+              <a:t>Tracker – open and browse issues from YouTrack, JIRA, GitHub, ...</a:t>
+            </a:r>
+            <a:endParaRPr lang="nl-BE" dirty="0" smtClean="0"/>
+          </a:p>
+          <a:p>
+            <a:pPr lvl="1"/>
+            <a:r>
+              <a:rPr lang="nl-BE" dirty="0" smtClean="0"/>
+              <a:t>HTML, CSS, JS tools</a:t>
+            </a:r>
+          </a:p>
+          <a:p>
+            <a:pPr lvl="1"/>
+            <a:r>
+              <a:rPr lang="nl-BE" dirty="0" smtClean="0"/>
+              <a:t>Framework </a:t>
+            </a:r>
+            <a:r>
+              <a:rPr lang="nl-BE" dirty="0" smtClean="0"/>
+              <a:t>Integration – integrate with Symfony, Yii, ...</a:t>
+            </a:r>
+          </a:p>
+          <a:p>
+            <a:pPr lvl="1"/>
+            <a:r>
+              <a:rPr lang="nl-BE" dirty="0" smtClean="0"/>
+              <a:t>GitHub support – pull requests, gists, ...</a:t>
+            </a:r>
+            <a:endParaRPr lang="nl-BE" dirty="0"/>
+          </a:p>
+        </p:txBody>
+      </p:sp>
+    </p:spTree>
+    <p:extLst>
+      <p:ext uri="{BB962C8B-B14F-4D97-AF65-F5344CB8AC3E}">
+        <p14:creationId xmlns:p14="http://schemas.microsoft.com/office/powerpoint/2010/main" val="2796552828"/>
+      </p:ext>
+    </p:extLst>
+  </p:cSld>
+  <p:clrMapOvr>
+    <a:masterClrMapping/>
+  </p:clrMapOvr>
+</p:sld>
+</file>
+
+<file path=ppt/slides/slide131.xml><?xml version="1.0" encoding="utf-8"?>
+<p:sld xmlns:a="http://schemas.openxmlformats.org/drawingml/2006/main" xmlns:r="http://schemas.openxmlformats.org/officeDocument/2006/relationships" xmlns:p="http://schemas.openxmlformats.org/presentationml/2006/main">
+  <p:cSld>
+    <p:spTree>
+      <p:nvGrpSpPr>
+        <p:cNvPr id="1" name=""/>
+        <p:cNvGrpSpPr/>
+        <p:nvPr/>
+      </p:nvGrpSpPr>
+      <p:grpSpPr>
+        <a:xfrm>
+          <a:off x="0" y="0"/>
+          <a:ext cx="0" cy="0"/>
+          <a:chOff x="0" y="0"/>
+          <a:chExt cx="0" cy="0"/>
+        </a:xfrm>
+      </p:grpSpPr>
+      <p:sp>
+        <p:nvSpPr>
+          <p:cNvPr id="4" name="Title 3"/>
+          <p:cNvSpPr>
+            <a:spLocks noGrp="1"/>
+          </p:cNvSpPr>
+          <p:nvPr>
+            <p:ph type="ctrTitle"/>
+          </p:nvPr>
+        </p:nvSpPr>
+        <p:spPr/>
+        <p:txBody>
+          <a:bodyPr/>
+          <a:lstStyle/>
+          <a:p>
+            <a:r>
+              <a:rPr lang="nl-BE" dirty="0" smtClean="0"/>
+              <a:t>Resources</a:t>
+            </a:r>
+            <a:endParaRPr lang="nl-BE" dirty="0"/>
+          </a:p>
+        </p:txBody>
+      </p:sp>
+      <p:sp>
+        <p:nvSpPr>
+          <p:cNvPr id="5" name="Subtitle 4"/>
+          <p:cNvSpPr>
+            <a:spLocks noGrp="1"/>
+          </p:cNvSpPr>
+          <p:nvPr>
+            <p:ph type="subTitle" idx="1"/>
+          </p:nvPr>
+        </p:nvSpPr>
+        <p:spPr/>
+        <p:txBody>
+          <a:bodyPr/>
+          <a:lstStyle/>
+          <a:p>
+            <a:endParaRPr lang="nl-BE"/>
+          </a:p>
+        </p:txBody>
+      </p:sp>
+    </p:spTree>
+    <p:extLst>
+      <p:ext uri="{BB962C8B-B14F-4D97-AF65-F5344CB8AC3E}">
+        <p14:creationId xmlns:p14="http://schemas.microsoft.com/office/powerpoint/2010/main" val="685546531"/>
+      </p:ext>
+    </p:extLst>
+  </p:cSld>
+  <p:clrMapOvr>
+    <a:masterClrMapping/>
+  </p:clrMapOvr>
+  <p:timing>
+    <p:tnLst>
+      <p:par>
+        <p:cTn id="1" dur="indefinite" restart="never" nodeType="tmRoot"/>
+      </p:par>
+    </p:tnLst>
+  </p:timing>
+</p:sld>
+</file>
+
+<file path=ppt/slides/slide132.xml><?xml version="1.0" encoding="utf-8"?>
+<p:sld xmlns:a="http://schemas.openxmlformats.org/drawingml/2006/main" xmlns:r="http://schemas.openxmlformats.org/officeDocument/2006/relationships" xmlns:p="http://schemas.openxmlformats.org/presentationml/2006/main">
+  <p:cSld>
+    <p:spTree>
+      <p:nvGrpSpPr>
+        <p:cNvPr id="1" name=""/>
+        <p:cNvGrpSpPr/>
+        <p:nvPr/>
+      </p:nvGrpSpPr>
+      <p:grpSpPr>
+        <a:xfrm>
+          <a:off x="0" y="0"/>
+          <a:ext cx="0" cy="0"/>
+          <a:chOff x="0" y="0"/>
+          <a:chExt cx="0" cy="0"/>
+        </a:xfrm>
+      </p:grpSpPr>
+      <p:sp>
+        <p:nvSpPr>
+          <p:cNvPr id="4" name="Title 3"/>
+          <p:cNvSpPr>
+            <a:spLocks noGrp="1"/>
+          </p:cNvSpPr>
+          <p:nvPr>
+            <p:ph type="title"/>
+          </p:nvPr>
+        </p:nvSpPr>
+        <p:spPr/>
+        <p:txBody>
+          <a:bodyPr/>
+          <a:lstStyle/>
+          <a:p>
+            <a:r>
+              <a:rPr lang="nl-BE" dirty="0" smtClean="0"/>
+              <a:t>Resources</a:t>
+            </a:r>
+            <a:endParaRPr lang="nl-BE" dirty="0"/>
+          </a:p>
+        </p:txBody>
+      </p:sp>
+      <p:sp>
+        <p:nvSpPr>
+          <p:cNvPr id="5" name="Content Placeholder 4"/>
+          <p:cNvSpPr>
+            <a:spLocks noGrp="1"/>
+          </p:cNvSpPr>
+          <p:nvPr>
+            <p:ph idx="1"/>
+          </p:nvPr>
+        </p:nvSpPr>
+        <p:spPr/>
+        <p:txBody>
+          <a:bodyPr>
+            <a:normAutofit/>
+          </a:bodyPr>
+          <a:lstStyle/>
+          <a:p>
+            <a:r>
+              <a:rPr lang="nl-BE" dirty="0" smtClean="0"/>
+              <a:t>Keyboard reference - </a:t>
+            </a:r>
+            <a:r>
+              <a:rPr lang="en-US" dirty="0" smtClean="0">
+                <a:hlinkClick r:id="rId2"/>
+              </a:rPr>
+              <a:t>http</a:t>
+            </a:r>
+            <a:r>
+              <a:rPr lang="en-US" dirty="0">
+                <a:hlinkClick r:id="rId2"/>
+              </a:rPr>
+              <a:t>://</a:t>
+            </a:r>
+            <a:r>
+              <a:rPr lang="en-US" dirty="0" smtClean="0">
+                <a:hlinkClick r:id="rId2"/>
+              </a:rPr>
+              <a:t>bit.ly/phpstorm-shortcuts</a:t>
+            </a:r>
+            <a:endParaRPr lang="en-US" dirty="0" smtClean="0"/>
+          </a:p>
+          <a:p>
+            <a:r>
+              <a:rPr lang="en-US" dirty="0" smtClean="0"/>
+              <a:t>Blog - </a:t>
+            </a:r>
+            <a:r>
+              <a:rPr lang="en-US" dirty="0" smtClean="0">
+                <a:hlinkClick r:id="rId3"/>
+              </a:rPr>
+              <a:t>http</a:t>
+            </a:r>
+            <a:r>
+              <a:rPr lang="en-US" dirty="0">
+                <a:hlinkClick r:id="rId3"/>
+              </a:rPr>
+              <a:t>://blog.jetbrains.com/phpstorm</a:t>
+            </a:r>
+            <a:r>
+              <a:rPr lang="en-US" dirty="0" smtClean="0">
+                <a:hlinkClick r:id="rId3"/>
+              </a:rPr>
+              <a:t>/</a:t>
+            </a:r>
+            <a:r>
+              <a:rPr lang="en-US" dirty="0" smtClean="0"/>
+              <a:t> </a:t>
+            </a:r>
+          </a:p>
+          <a:p>
+            <a:r>
+              <a:rPr lang="en-US" dirty="0"/>
+              <a:t>Web </a:t>
+            </a:r>
+            <a:r>
+              <a:rPr lang="en-US" dirty="0" smtClean="0"/>
+              <a:t>Help - </a:t>
+            </a:r>
+            <a:r>
+              <a:rPr lang="en-US" dirty="0" smtClean="0">
+                <a:hlinkClick r:id="rId4"/>
+              </a:rPr>
+              <a:t>http</a:t>
+            </a:r>
+            <a:r>
+              <a:rPr lang="en-US" dirty="0">
+                <a:hlinkClick r:id="rId4"/>
+              </a:rPr>
+              <a:t>://www.jetbrains.com/phpstorm/webhelp</a:t>
+            </a:r>
+            <a:r>
+              <a:rPr lang="en-US" dirty="0" smtClean="0">
+                <a:hlinkClick r:id="rId4"/>
+              </a:rPr>
+              <a:t>/</a:t>
+            </a:r>
+            <a:endParaRPr lang="en-US" dirty="0" smtClean="0"/>
+          </a:p>
+          <a:p>
+            <a:r>
+              <a:rPr lang="en-US" dirty="0" smtClean="0"/>
+              <a:t>Tutorials - </a:t>
+            </a:r>
+            <a:r>
+              <a:rPr lang="en-US" dirty="0" smtClean="0">
+                <a:hlinkClick r:id="rId5"/>
+              </a:rPr>
+              <a:t>http</a:t>
+            </a:r>
+            <a:r>
+              <a:rPr lang="en-US" dirty="0">
+                <a:hlinkClick r:id="rId5"/>
+              </a:rPr>
+              <a:t>://</a:t>
+            </a:r>
+            <a:r>
+              <a:rPr lang="en-US" dirty="0" smtClean="0">
+                <a:hlinkClick r:id="rId5"/>
+              </a:rPr>
+              <a:t>confluence.jetbrains.com/display/PhpStorm/Tutorials</a:t>
+            </a:r>
+            <a:endParaRPr lang="en-US" dirty="0" smtClean="0"/>
+          </a:p>
+          <a:p>
+            <a:r>
+              <a:rPr lang="en-US" dirty="0"/>
+              <a:t>Courseware (</a:t>
+            </a:r>
+            <a:r>
+              <a:rPr lang="en-US" dirty="0" smtClean="0"/>
+              <a:t>videos</a:t>
+            </a:r>
+            <a:r>
+              <a:rPr lang="en-US" dirty="0"/>
+              <a:t>) – </a:t>
+            </a:r>
+            <a:r>
+              <a:rPr lang="en-US" dirty="0">
+                <a:hlinkClick r:id="rId6"/>
+              </a:rPr>
+              <a:t>http://</a:t>
+            </a:r>
+            <a:r>
+              <a:rPr lang="en-US" dirty="0" smtClean="0">
+                <a:hlinkClick r:id="rId6"/>
+              </a:rPr>
+              <a:t>bit.ly/phpstorm-videos</a:t>
+            </a:r>
+            <a:r>
+              <a:rPr lang="en-US" dirty="0" smtClean="0"/>
+              <a:t> </a:t>
+            </a:r>
+            <a:endParaRPr lang="en-US" dirty="0"/>
+          </a:p>
+          <a:p>
+            <a:r>
+              <a:rPr lang="en-US" dirty="0" smtClean="0"/>
+              <a:t>Webinars - </a:t>
+            </a:r>
+            <a:r>
+              <a:rPr lang="en-US" dirty="0" smtClean="0">
+                <a:hlinkClick r:id="rId7"/>
+              </a:rPr>
+              <a:t>http</a:t>
+            </a:r>
+            <a:r>
+              <a:rPr lang="en-US" dirty="0">
+                <a:hlinkClick r:id="rId7"/>
+              </a:rPr>
+              <a:t>://blog.jetbrains.com/phpstorm/tag/webinar</a:t>
+            </a:r>
+            <a:r>
+              <a:rPr lang="en-US" dirty="0" smtClean="0">
+                <a:hlinkClick r:id="rId7"/>
+              </a:rPr>
+              <a:t>/</a:t>
+            </a:r>
+            <a:endParaRPr lang="en-US" dirty="0" smtClean="0"/>
+          </a:p>
+          <a:p>
+            <a:r>
+              <a:rPr lang="en-US" dirty="0" smtClean="0"/>
+              <a:t>Twitter - </a:t>
+            </a:r>
+            <a:r>
+              <a:rPr lang="en-US" dirty="0" smtClean="0">
+                <a:hlinkClick r:id="rId8"/>
+              </a:rPr>
+              <a:t>https</a:t>
+            </a:r>
+            <a:r>
+              <a:rPr lang="en-US" dirty="0">
+                <a:hlinkClick r:id="rId8"/>
+              </a:rPr>
+              <a:t>://</a:t>
+            </a:r>
+            <a:r>
+              <a:rPr lang="en-US" dirty="0" smtClean="0">
+                <a:hlinkClick r:id="rId8"/>
+              </a:rPr>
+              <a:t>twitter.com/phpstorm</a:t>
+            </a:r>
+            <a:endParaRPr lang="nl-BE" dirty="0"/>
+          </a:p>
+        </p:txBody>
+      </p:sp>
+    </p:spTree>
+    <p:extLst>
+      <p:ext uri="{BB962C8B-B14F-4D97-AF65-F5344CB8AC3E}">
+        <p14:creationId xmlns:p14="http://schemas.microsoft.com/office/powerpoint/2010/main" val="3169142718"/>
+      </p:ext>
+    </p:extLst>
+  </p:cSld>
+  <p:clrMapOvr>
+    <a:masterClrMapping/>
+  </p:clrMapOvr>
+</p:sld>
+</file>
+
+<file path=ppt/slides/slide133.xml><?xml version="1.0" encoding="utf-8"?>
+<p:sld xmlns:a="http://schemas.openxmlformats.org/drawingml/2006/main" xmlns:r="http://schemas.openxmlformats.org/officeDocument/2006/relationships" xmlns:p="http://schemas.openxmlformats.org/presentationml/2006/main">
+  <p:cSld>
+    <p:spTree>
+      <p:nvGrpSpPr>
+        <p:cNvPr id="1" name=""/>
+        <p:cNvGrpSpPr/>
+        <p:nvPr/>
+      </p:nvGrpSpPr>
+      <p:grpSpPr>
+        <a:xfrm>
+          <a:off x="0" y="0"/>
+          <a:ext cx="0" cy="0"/>
+          <a:chOff x="0" y="0"/>
+          <a:chExt cx="0" cy="0"/>
+        </a:xfrm>
+      </p:grpSpPr>
+    </p:spTree>
+    <p:extLst>
+      <p:ext uri="{BB962C8B-B14F-4D97-AF65-F5344CB8AC3E}">
+        <p14:creationId xmlns:p14="http://schemas.microsoft.com/office/powerpoint/2010/main" val="618802910"/>
+      </p:ext>
+    </p:extLst>
+  </p:cSld>
+  <p:clrMapOvr>
+    <a:masterClrMapping/>
+  </p:clrMapOvr>
 </p:sld>
 </file>
 
@@ -10612,11 +12281,7 @@
           <a:p>
             <a:r>
               <a:rPr lang="en-US" dirty="0" smtClean="0"/>
-              <a:t>Please get the sample project from </a:t>
-            </a:r>
-            <a:r>
-              <a:rPr lang="en-US" dirty="0" smtClean="0"/>
-              <a:t>GitHub:</a:t>
+              <a:t>Please get the sample project from GitHub:</a:t>
             </a:r>
           </a:p>
           <a:p>
@@ -15520,13 +17185,8 @@
           <a:p>
             <a:r>
               <a:rPr lang="en-US" dirty="0" smtClean="0"/>
-              <a:t>We will not cover every knob and </a:t>
-            </a:r>
-            <a:r>
-              <a:rPr lang="en-US" dirty="0" smtClean="0"/>
-              <a:t>bolt</a:t>
-            </a:r>
-            <a:endParaRPr lang="en-US" dirty="0" smtClean="0"/>
+              <a:t>We will not cover every knob and bolt</a:t>
+            </a:r>
           </a:p>
           <a:p>
             <a:r>
@@ -27673,12 +29333,31 @@
         </p:nvSpPr>
         <p:spPr/>
         <p:txBody>
-          <a:bodyPr/>
-          <a:lstStyle/>
+          <a:bodyPr>
+            <a:normAutofit fontScale="92500" lnSpcReduction="10000"/>
+          </a:bodyPr>
+          <a:lstStyle/>
+          <a:p>
+            <a:r>
+              <a:rPr lang="nl-BE" dirty="0"/>
+              <a:t>May require a plugin to be installed, e.g. </a:t>
+            </a:r>
+            <a:r>
+              <a:rPr lang="nl-BE" dirty="0" smtClean="0">
+                <a:hlinkClick r:id="rId2"/>
+              </a:rPr>
+              <a:t>Karma</a:t>
+            </a:r>
+            <a:endParaRPr lang="nl-BE" dirty="0" smtClean="0"/>
+          </a:p>
           <a:p>
             <a:r>
               <a:rPr lang="nl-BE" dirty="0" smtClean="0"/>
-              <a:t>Using Karma or JSTestDriver.</a:t>
+              <a:t>Using </a:t>
+            </a:r>
+            <a:r>
+              <a:rPr lang="nl-BE" dirty="0" smtClean="0"/>
+              <a:t>Karma or JSTestDriver.</a:t>
             </a:r>
           </a:p>
           <a:p>
@@ -27692,7 +29371,7 @@
             </a:br>
             <a:r>
               <a:rPr lang="nl-BE" sz="1200" dirty="0" smtClean="0">
-                <a:hlinkClick r:id="rId2"/>
+                <a:hlinkClick r:id="rId3"/>
               </a:rPr>
               <a:t>https://www.jetbrains.com/phpstorm/webhelp/preparing-to-use-karma-test-runner.html</a:t>
             </a:r>
@@ -27709,7 +29388,7 @@
             </a:br>
             <a:r>
               <a:rPr lang="nl-BE" sz="1200" dirty="0" smtClean="0">
-                <a:hlinkClick r:id="rId3"/>
+                <a:hlinkClick r:id="rId4"/>
               </a:rPr>
               <a:t>https://www.jetbrains.com/phpstorm/webhelp/preparing-to-use-jstestdriver-test-runner.html</a:t>
             </a:r>
@@ -27766,7 +29445,7 @@
           </p:nvPr>
         </p:nvPicPr>
         <p:blipFill>
-          <a:blip r:embed="rId4"/>
+          <a:blip r:embed="rId5"/>
           <a:stretch>
             <a:fillRect/>
           </a:stretch>
@@ -27779,6 +29458,40 @@
           <a:prstGeom prst="rect">
             <a:avLst/>
           </a:prstGeom>
+        </p:spPr>
+      </p:pic>
+      <p:pic>
+        <p:nvPicPr>
+          <p:cNvPr id="2" name="Picture 1"/>
+          <p:cNvPicPr>
+            <a:picLocks noChangeAspect="1"/>
+          </p:cNvPicPr>
+          <p:nvPr/>
+        </p:nvPicPr>
+        <p:blipFill>
+          <a:blip r:embed="rId6"/>
+          <a:stretch>
+            <a:fillRect/>
+          </a:stretch>
+        </p:blipFill>
+        <p:spPr>
+          <a:xfrm>
+            <a:off x="8693394" y="4001538"/>
+            <a:ext cx="3105150" cy="1914525"/>
+          </a:xfrm>
+          <a:prstGeom prst="rect">
+            <a:avLst/>
+          </a:prstGeom>
+          <a:ln>
+            <a:noFill/>
+          </a:ln>
+          <a:effectLst>
+            <a:outerShdw blurRad="292100" dist="139700" dir="2700000" algn="tl" rotWithShape="0">
+              <a:srgbClr val="333333">
+                <a:alpha val="65000"/>
+              </a:srgbClr>
+            </a:outerShdw>
+          </a:effectLst>
         </p:spPr>
       </p:pic>
     </p:spTree>
@@ -27907,11 +29620,7 @@
           <a:p>
             <a:r>
               <a:rPr lang="en-US" dirty="0" smtClean="0"/>
-              <a:t>Version </a:t>
-            </a:r>
-            <a:r>
-              <a:rPr lang="en-US" dirty="0" smtClean="0"/>
-              <a:t>Control</a:t>
+              <a:t>Version Control</a:t>
             </a:r>
             <a:endParaRPr lang="nl-BE" dirty="0"/>
           </a:p>

</xml_diff>

<commit_message>
Updated the slide deck to always make use of Composer project type to get started.
</commit_message>
<xml_diff>
--- a/PhpStorm Workshop.pptx
+++ b/PhpStorm Workshop.pptx
@@ -240,6 +240,203 @@
     </a:lvl9pPr>
   </p:defaultTextStyle>
   <p:extLst>
+    <p:ext uri="{521415D9-36F7-43E2-AB2F-B90AF26B5E84}">
+      <p14:sectionLst xmlns:p14="http://schemas.microsoft.com/office/powerpoint/2010/main">
+        <p14:section name="Default Section" id="{2CCF5C4C-BFF7-456C-852F-C484D7276E3B}">
+          <p14:sldIdLst>
+            <p14:sldId id="256"/>
+            <p14:sldId id="260"/>
+            <p14:sldId id="261"/>
+            <p14:sldId id="262"/>
+            <p14:sldId id="263"/>
+            <p14:sldId id="265"/>
+          </p14:sldIdLst>
+        </p14:section>
+        <p14:section name="Look at the IDE" id="{87B793E8-09B3-4653-827B-1BD912D64884}">
+          <p14:sldIdLst>
+            <p14:sldId id="266"/>
+            <p14:sldId id="267"/>
+            <p14:sldId id="268"/>
+            <p14:sldId id="316"/>
+            <p14:sldId id="329"/>
+            <p14:sldId id="300"/>
+            <p14:sldId id="269"/>
+          </p14:sldIdLst>
+        </p14:section>
+        <p14:section name="Navigation" id="{5FAEFB0A-B8BD-45CC-94E1-39B507CC8C0E}">
+          <p14:sldIdLst>
+            <p14:sldId id="270"/>
+            <p14:sldId id="295"/>
+            <p14:sldId id="296"/>
+            <p14:sldId id="274"/>
+            <p14:sldId id="275"/>
+            <p14:sldId id="276"/>
+            <p14:sldId id="277"/>
+            <p14:sldId id="278"/>
+            <p14:sldId id="279"/>
+            <p14:sldId id="292"/>
+            <p14:sldId id="280"/>
+            <p14:sldId id="281"/>
+            <p14:sldId id="283"/>
+            <p14:sldId id="285"/>
+            <p14:sldId id="286"/>
+            <p14:sldId id="287"/>
+            <p14:sldId id="288"/>
+            <p14:sldId id="289"/>
+            <p14:sldId id="290"/>
+          </p14:sldIdLst>
+        </p14:section>
+        <p14:section name="Editing" id="{0365646B-E8CA-4D23-A025-BC95D565CEA3}">
+          <p14:sldIdLst>
+            <p14:sldId id="271"/>
+            <p14:sldId id="301"/>
+            <p14:sldId id="302"/>
+            <p14:sldId id="304"/>
+            <p14:sldId id="305"/>
+            <p14:sldId id="306"/>
+            <p14:sldId id="307"/>
+            <p14:sldId id="311"/>
+            <p14:sldId id="308"/>
+            <p14:sldId id="348"/>
+          </p14:sldIdLst>
+        </p14:section>
+        <p14:section name="Inspections" id="{BE23A414-17B9-4105-9633-D001A1F93C40}">
+          <p14:sldIdLst>
+            <p14:sldId id="273"/>
+            <p14:sldId id="309"/>
+            <p14:sldId id="310"/>
+            <p14:sldId id="312"/>
+            <p14:sldId id="313"/>
+            <p14:sldId id="314"/>
+            <p14:sldId id="315"/>
+            <p14:sldId id="317"/>
+          </p14:sldIdLst>
+        </p14:section>
+        <p14:section name="Live Templates" id="{082FBAFA-8B1C-4ACA-A6B2-E001A7DC9B9F}">
+          <p14:sldIdLst>
+            <p14:sldId id="272"/>
+            <p14:sldId id="323"/>
+            <p14:sldId id="326"/>
+            <p14:sldId id="322"/>
+            <p14:sldId id="327"/>
+          </p14:sldIdLst>
+        </p14:section>
+        <p14:section name="Refactoring" id="{25E53FF6-01ED-4FF4-96ED-7215CF360EF7}">
+          <p14:sldIdLst>
+            <p14:sldId id="320"/>
+            <p14:sldId id="330"/>
+            <p14:sldId id="331"/>
+            <p14:sldId id="346"/>
+            <p14:sldId id="332"/>
+            <p14:sldId id="333"/>
+            <p14:sldId id="334"/>
+            <p14:sldId id="347"/>
+            <p14:sldId id="336"/>
+            <p14:sldId id="337"/>
+            <p14:sldId id="338"/>
+            <p14:sldId id="339"/>
+            <p14:sldId id="340"/>
+            <p14:sldId id="341"/>
+            <p14:sldId id="342"/>
+            <p14:sldId id="343"/>
+            <p14:sldId id="344"/>
+          </p14:sldIdLst>
+        </p14:section>
+        <p14:section name="Debugging" id="{CF904EA5-9CF9-4DAA-8700-61780622D5A7}">
+          <p14:sldIdLst>
+            <p14:sldId id="297"/>
+            <p14:sldId id="350"/>
+            <p14:sldId id="351"/>
+            <p14:sldId id="355"/>
+            <p14:sldId id="352"/>
+            <p14:sldId id="354"/>
+            <p14:sldId id="356"/>
+            <p14:sldId id="357"/>
+            <p14:sldId id="353"/>
+            <p14:sldId id="359"/>
+            <p14:sldId id="358"/>
+            <p14:sldId id="360"/>
+            <p14:sldId id="361"/>
+          </p14:sldIdLst>
+        </p14:section>
+        <p14:section name="Todo Explorer" id="{BD9379FA-FE3C-4CC5-86DA-8BF3D0C79856}">
+          <p14:sldIdLst>
+            <p14:sldId id="321"/>
+            <p14:sldId id="362"/>
+            <p14:sldId id="363"/>
+            <p14:sldId id="364"/>
+          </p14:sldIdLst>
+        </p14:section>
+        <p14:section name="Unit Testing" id="{380FA852-8B14-4F60-B62A-555991B285DE}">
+          <p14:sldIdLst>
+            <p14:sldId id="298"/>
+            <p14:sldId id="366"/>
+            <p14:sldId id="367"/>
+            <p14:sldId id="368"/>
+            <p14:sldId id="371"/>
+            <p14:sldId id="370"/>
+          </p14:sldIdLst>
+        </p14:section>
+        <p14:section name="Version Control" id="{B9008E7F-F25F-44B3-8BEA-6B2E4F243DC4}">
+          <p14:sldIdLst>
+            <p14:sldId id="299"/>
+            <p14:sldId id="373"/>
+            <p14:sldId id="375"/>
+            <p14:sldId id="376"/>
+            <p14:sldId id="378"/>
+            <p14:sldId id="379"/>
+            <p14:sldId id="385"/>
+            <p14:sldId id="386"/>
+            <p14:sldId id="389"/>
+            <p14:sldId id="390"/>
+            <p14:sldId id="391"/>
+            <p14:sldId id="392"/>
+            <p14:sldId id="393"/>
+            <p14:sldId id="394"/>
+            <p14:sldId id="395"/>
+            <p14:sldId id="396"/>
+          </p14:sldIdLst>
+        </p14:section>
+        <p14:section name="Databases" id="{FF4B1F74-B155-4171-A626-888E1FD738CD}">
+          <p14:sldIdLst>
+            <p14:sldId id="318"/>
+            <p14:sldId id="397"/>
+            <p14:sldId id="398"/>
+            <p14:sldId id="399"/>
+            <p14:sldId id="400"/>
+            <p14:sldId id="401"/>
+          </p14:sldIdLst>
+        </p14:section>
+        <p14:section name="Tools" id="{69141823-B7B5-419A-9C3A-1C725C1A075F}">
+          <p14:sldIdLst>
+            <p14:sldId id="319"/>
+            <p14:sldId id="403"/>
+            <p14:sldId id="404"/>
+            <p14:sldId id="405"/>
+            <p14:sldId id="407"/>
+            <p14:sldId id="406"/>
+            <p14:sldId id="408"/>
+          </p14:sldIdLst>
+        </p14:section>
+        <p14:section name="Plugins" id="{C2A12E4D-7700-4181-BB29-393186C6BAAF}">
+          <p14:sldIdLst>
+            <p14:sldId id="328"/>
+            <p14:sldId id="411"/>
+            <p14:sldId id="412"/>
+            <p14:sldId id="413"/>
+          </p14:sldIdLst>
+        </p14:section>
+        <p14:section name="Resources" id="{4E4B4BCF-F46B-4A84-A49F-72B50891537F}">
+          <p14:sldIdLst>
+            <p14:sldId id="409"/>
+            <p14:sldId id="324"/>
+            <p14:sldId id="410"/>
+            <p14:sldId id="325"/>
+            <p14:sldId id="259"/>
+          </p14:sldIdLst>
+        </p14:section>
+      </p14:sectionLst>
+    </p:ext>
     <p:ext uri="{EFAFB233-063F-42B5-8137-9DF3F51BA10A}">
       <p15:sldGuideLst xmlns:p15="http://schemas.microsoft.com/office/powerpoint/2012/main"/>
     </p:ext>
@@ -329,7 +526,7 @@
           <a:p>
             <a:fld id="{452BE2B3-0986-4328-AEFF-1FEDD7FB83AD}" type="datetimeFigureOut">
               <a:rPr lang="nl-BE" smtClean="0"/>
-              <a:t>8/01/2014</a:t>
+              <a:t>9/01/2014</a:t>
             </a:fld>
             <a:endParaRPr lang="nl-BE"/>
           </a:p>
@@ -10127,7 +10324,6 @@
               <a:rPr lang="nl-BE" dirty="0"/>
               <a:t>...</a:t>
             </a:r>
-            <a:endParaRPr lang="nl-BE" dirty="0"/>
           </a:p>
         </p:txBody>
       </p:sp>
@@ -10264,7 +10460,7 @@
           <a:p>
             <a:r>
               <a:rPr lang="nl-BE" dirty="0" smtClean="0"/>
-              <a:t>Let’s clone a project from GitHub</a:t>
+              <a:t>Let’s fetch the workshop materials</a:t>
             </a:r>
             <a:endParaRPr lang="nl-BE" dirty="0"/>
           </a:p>
@@ -10282,59 +10478,93 @@
         </p:nvSpPr>
         <p:spPr/>
         <p:txBody>
-          <a:bodyPr/>
+          <a:bodyPr>
+            <a:normAutofit/>
+          </a:bodyPr>
           <a:lstStyle/>
           <a:p>
             <a:r>
               <a:rPr lang="nl-BE" dirty="0" smtClean="0"/>
-              <a:t>Start PhpStorm and if a project is opened, close it</a:t>
-            </a:r>
-          </a:p>
-          <a:p>
+              <a:t>Start PhpStorm and if a project is opened, close </a:t>
+            </a:r>
             <a:r>
               <a:rPr lang="nl-BE" dirty="0" smtClean="0"/>
-              <a:t>Use “Checkout from Version Control”</a:t>
+              <a:t>it</a:t>
+            </a:r>
+          </a:p>
+          <a:p>
+            <a:r>
+              <a:rPr lang="nl-BE" dirty="0" smtClean="0"/>
+              <a:t>Create a new project, name it “Workshop” and select the “Composer project” type</a:t>
+            </a:r>
+          </a:p>
+          <a:p>
+            <a:r>
+              <a:rPr lang="nl-BE" dirty="0"/>
+              <a:t>Find the “</a:t>
+            </a:r>
+            <a:r>
+              <a:rPr lang="nl-BE" dirty="0" smtClean="0"/>
+              <a:t>jetbrains/phpstorm-workshop” package and click OK</a:t>
+            </a:r>
+          </a:p>
+          <a:p>
+            <a:endParaRPr lang="nl-BE" dirty="0" smtClean="0"/>
+          </a:p>
+          <a:p>
+            <a:endParaRPr lang="nl-BE" dirty="0"/>
+          </a:p>
+          <a:p>
+            <a:r>
+              <a:rPr lang="nl-BE" sz="2000" i="1" dirty="0" smtClean="0"/>
+              <a:t>Alternatively, u</a:t>
+            </a:r>
+            <a:r>
+              <a:rPr lang="nl-BE" sz="2000" i="1" dirty="0" smtClean="0"/>
+              <a:t>se </a:t>
+            </a:r>
+            <a:r>
+              <a:rPr lang="nl-BE" sz="2000" i="1" dirty="0" smtClean="0"/>
+              <a:t>“Checkout from Version Control”</a:t>
             </a:r>
           </a:p>
           <a:p>
             <a:pPr lvl="1"/>
             <a:r>
-              <a:rPr lang="nl-BE" dirty="0" smtClean="0"/>
+              <a:rPr lang="nl-BE" sz="2000" i="1" dirty="0" smtClean="0"/>
               <a:t>Repository: </a:t>
             </a:r>
             <a:r>
-              <a:rPr lang="nl-BE" dirty="0" smtClean="0">
+              <a:rPr lang="nl-BE" sz="2000" i="1" dirty="0" smtClean="0">
                 <a:hlinkClick r:id="rId2"/>
               </a:rPr>
               <a:t>https</a:t>
             </a:r>
             <a:r>
-              <a:rPr lang="nl-BE" dirty="0">
+              <a:rPr lang="nl-BE" sz="2000" i="1" dirty="0">
                 <a:hlinkClick r:id="rId2"/>
               </a:rPr>
               <a:t>://</a:t>
             </a:r>
             <a:r>
-              <a:rPr lang="nl-BE" dirty="0" smtClean="0">
+              <a:rPr lang="nl-BE" sz="2000" i="1" dirty="0" smtClean="0">
                 <a:hlinkClick r:id="rId2"/>
               </a:rPr>
               <a:t>github.com/maartenba-demo/phpstorm-workshop.git</a:t>
             </a:r>
-            <a:endParaRPr lang="nl-BE" dirty="0" smtClean="0"/>
+            <a:endParaRPr lang="nl-BE" sz="2000" i="1" dirty="0" smtClean="0"/>
           </a:p>
           <a:p>
             <a:pPr lvl="1"/>
             <a:r>
-              <a:rPr lang="nl-BE" dirty="0" smtClean="0"/>
-              <a:t>Project / directory name: Workshop</a:t>
-            </a:r>
-          </a:p>
-          <a:p>
-            <a:r>
-              <a:rPr lang="nl-BE" dirty="0" smtClean="0"/>
-              <a:t>We are now good to go!</a:t>
-            </a:r>
-            <a:endParaRPr lang="nl-BE" dirty="0"/>
+              <a:rPr lang="nl-BE" sz="2000" i="1" dirty="0" smtClean="0"/>
+              <a:t>Project / directory name: </a:t>
+            </a:r>
+            <a:r>
+              <a:rPr lang="nl-BE" sz="2000" i="1" dirty="0" smtClean="0"/>
+              <a:t>Workshop</a:t>
+            </a:r>
+            <a:endParaRPr lang="nl-BE" sz="2000" i="1" dirty="0" smtClean="0"/>
           </a:p>
         </p:txBody>
       </p:sp>
@@ -10417,11 +10647,7 @@
           <a:p>
             <a:r>
               <a:rPr lang="nl-BE" dirty="0" smtClean="0"/>
-              <a:t>Be sure to t</a:t>
-            </a:r>
-            <a:r>
-              <a:rPr lang="nl-BE" dirty="0" smtClean="0"/>
-              <a:t>ry these afterwards!</a:t>
+              <a:t>Be sure to try these afterwards!</a:t>
             </a:r>
           </a:p>
           <a:p>
@@ -10430,31 +10656,20 @@
               <a:rPr lang="nl-BE" dirty="0" smtClean="0"/>
               <a:t>File Watchers – monitor a file and run command when it changes (e.g. LESS to CSS)</a:t>
             </a:r>
-            <a:endParaRPr lang="nl-BE" dirty="0" smtClean="0"/>
           </a:p>
           <a:p>
             <a:pPr lvl="1"/>
             <a:r>
               <a:rPr lang="nl-BE" dirty="0" smtClean="0"/>
-              <a:t>Google App </a:t>
-            </a:r>
+              <a:t>Google App Engine – work with GAE development environment and deploy</a:t>
+            </a:r>
+          </a:p>
+          <a:p>
+            <a:pPr lvl="1"/>
             <a:r>
               <a:rPr lang="nl-BE" dirty="0" smtClean="0"/>
-              <a:t>Engine – work with GAE development environment and deploy</a:t>
-            </a:r>
-            <a:endParaRPr lang="nl-BE" dirty="0" smtClean="0"/>
-          </a:p>
-          <a:p>
-            <a:pPr lvl="1"/>
-            <a:r>
-              <a:rPr lang="nl-BE" dirty="0" smtClean="0"/>
-              <a:t>Remote Tools / </a:t>
-            </a:r>
-            <a:r>
-              <a:rPr lang="nl-BE" dirty="0" smtClean="0"/>
-              <a:t>Deployment – deploy project to remote server</a:t>
-            </a:r>
-            <a:endParaRPr lang="nl-BE" dirty="0" smtClean="0"/>
+              <a:t>Remote Tools / Deployment – deploy project to remote server</a:t>
+            </a:r>
           </a:p>
           <a:p>
             <a:pPr lvl="1"/>
@@ -10462,31 +10677,20 @@
               <a:rPr lang="nl-BE" dirty="0" smtClean="0"/>
               <a:t>Drupal Support – project support, code style, hooks, ...</a:t>
             </a:r>
-            <a:endParaRPr lang="nl-BE" dirty="0" smtClean="0"/>
           </a:p>
           <a:p>
             <a:pPr lvl="1"/>
             <a:r>
               <a:rPr lang="nl-BE" dirty="0" smtClean="0"/>
-              <a:t>Live </a:t>
-            </a:r>
+              <a:t>Live Edit – view changes live in browser and vice-versa</a:t>
+            </a:r>
+          </a:p>
+          <a:p>
+            <a:pPr lvl="1"/>
             <a:r>
               <a:rPr lang="nl-BE" dirty="0" smtClean="0"/>
-              <a:t>Edit – view changes live in browser and vice-versa</a:t>
-            </a:r>
-            <a:endParaRPr lang="nl-BE" dirty="0" smtClean="0"/>
-          </a:p>
-          <a:p>
-            <a:pPr lvl="1"/>
-            <a:r>
-              <a:rPr lang="nl-BE" dirty="0" smtClean="0"/>
-              <a:t>Issue </a:t>
-            </a:r>
-            <a:r>
-              <a:rPr lang="nl-BE" dirty="0" smtClean="0"/>
-              <a:t>Tracker – open and browse issues from YouTrack, JIRA, GitHub, ...</a:t>
-            </a:r>
-            <a:endParaRPr lang="nl-BE" dirty="0" smtClean="0"/>
+              <a:t>Issue Tracker – open and browse issues from YouTrack, JIRA, GitHub, ...</a:t>
+            </a:r>
           </a:p>
           <a:p>
             <a:pPr lvl="1"/>
@@ -10499,11 +10703,7 @@
             <a:pPr lvl="1"/>
             <a:r>
               <a:rPr lang="nl-BE" dirty="0" smtClean="0"/>
-              <a:t>Framework </a:t>
-            </a:r>
-            <a:r>
-              <a:rPr lang="nl-BE" dirty="0" smtClean="0"/>
-              <a:t>Integration – integrate with Symfony, Yii, ...</a:t>
+              <a:t>Framework Integration – integrate with Symfony, Yii, ...</a:t>
             </a:r>
           </a:p>
           <a:p>
@@ -12267,45 +12467,13 @@
               <a:t>http://</a:t>
             </a:r>
             <a:r>
-              <a:rPr lang="en-US" dirty="0" smtClean="0">
+              <a:rPr lang="en-US" smtClean="0">
                 <a:hlinkClick r:id="rId4"/>
               </a:rPr>
               <a:t>bit.ly/phpstorm-mamp</a:t>
             </a:r>
             <a:r>
-              <a:rPr lang="en-US" dirty="0" smtClean="0"/>
-              <a:t> </a:t>
-            </a:r>
-            <a:endParaRPr lang="en-US" dirty="0"/>
-          </a:p>
-          <a:p>
-            <a:r>
-              <a:rPr lang="en-US" dirty="0" smtClean="0"/>
-              <a:t>Please get the sample project from GitHub:</a:t>
-            </a:r>
-          </a:p>
-          <a:p>
-            <a:pPr lvl="1"/>
-            <a:r>
-              <a:rPr lang="en-US" dirty="0" smtClean="0">
-                <a:hlinkClick r:id="rId5"/>
-              </a:rPr>
-              <a:t>https</a:t>
-            </a:r>
-            <a:r>
-              <a:rPr lang="en-US" dirty="0">
-                <a:hlinkClick r:id="rId5"/>
-              </a:rPr>
-              <a:t>://</a:t>
-            </a:r>
-            <a:r>
-              <a:rPr lang="en-US" dirty="0" smtClean="0">
-                <a:hlinkClick r:id="rId5"/>
-              </a:rPr>
-              <a:t>github.com/maartenba-demo/phpstorm-workshop.git</a:t>
-            </a:r>
-            <a:r>
-              <a:rPr lang="en-US" dirty="0" smtClean="0"/>
+              <a:rPr lang="en-US" smtClean="0"/>
               <a:t> </a:t>
             </a:r>
             <a:endParaRPr lang="en-US" dirty="0"/>
@@ -21442,7 +21610,7 @@
           <a:p>
             <a:r>
               <a:rPr lang="nl-BE" dirty="0" smtClean="0"/>
-              <a:t>TODO Agenda</a:t>
+              <a:t>Agenda</a:t>
             </a:r>
             <a:endParaRPr lang="nl-BE" dirty="0"/>
           </a:p>
@@ -21455,14 +21623,126 @@
             <a:spLocks noGrp="1"/>
           </p:cNvSpPr>
           <p:nvPr>
-            <p:ph idx="1"/>
+            <p:ph sz="half" idx="1"/>
           </p:nvPr>
         </p:nvSpPr>
         <p:spPr/>
         <p:txBody>
-          <a:bodyPr/>
-          <a:lstStyle/>
-          <a:p>
+          <a:bodyPr>
+            <a:normAutofit/>
+          </a:bodyPr>
+          <a:lstStyle/>
+          <a:p>
+            <a:r>
+              <a:rPr lang="nl-BE" dirty="0" smtClean="0"/>
+              <a:t>Look at the IDE</a:t>
+            </a:r>
+          </a:p>
+          <a:p>
+            <a:r>
+              <a:rPr lang="nl-BE" dirty="0" smtClean="0"/>
+              <a:t>Navigation</a:t>
+            </a:r>
+          </a:p>
+          <a:p>
+            <a:r>
+              <a:rPr lang="nl-BE" dirty="0" smtClean="0"/>
+              <a:t>Editing</a:t>
+            </a:r>
+          </a:p>
+          <a:p>
+            <a:r>
+              <a:rPr lang="nl-BE" dirty="0" smtClean="0"/>
+              <a:t>Inspections</a:t>
+            </a:r>
+          </a:p>
+          <a:p>
+            <a:r>
+              <a:rPr lang="nl-BE" dirty="0" smtClean="0"/>
+              <a:t>Live Templates</a:t>
+            </a:r>
+          </a:p>
+          <a:p>
+            <a:r>
+              <a:rPr lang="nl-BE" dirty="0" smtClean="0"/>
+              <a:t>Refactoring</a:t>
+            </a:r>
+          </a:p>
+          <a:p>
+            <a:r>
+              <a:rPr lang="nl-BE" dirty="0"/>
+              <a:t>Debugging</a:t>
+            </a:r>
+          </a:p>
+          <a:p>
+            <a:pPr marL="0" indent="0">
+              <a:buNone/>
+            </a:pPr>
+            <a:endParaRPr lang="nl-BE" dirty="0" smtClean="0"/>
+          </a:p>
+          <a:p>
+            <a:endParaRPr lang="nl-BE" dirty="0" smtClean="0"/>
+          </a:p>
+          <a:p>
+            <a:endParaRPr lang="nl-BE" dirty="0"/>
+          </a:p>
+        </p:txBody>
+      </p:sp>
+      <p:sp>
+        <p:nvSpPr>
+          <p:cNvPr id="2" name="Content Placeholder 1"/>
+          <p:cNvSpPr>
+            <a:spLocks noGrp="1"/>
+          </p:cNvSpPr>
+          <p:nvPr>
+            <p:ph sz="half" idx="2"/>
+          </p:nvPr>
+        </p:nvSpPr>
+        <p:spPr/>
+        <p:txBody>
+          <a:bodyPr>
+            <a:normAutofit/>
+          </a:bodyPr>
+          <a:lstStyle/>
+          <a:p>
+            <a:r>
+              <a:rPr lang="nl-BE" dirty="0" smtClean="0"/>
+              <a:t>Todo </a:t>
+            </a:r>
+            <a:r>
+              <a:rPr lang="nl-BE" dirty="0"/>
+              <a:t>Explorer</a:t>
+            </a:r>
+          </a:p>
+          <a:p>
+            <a:r>
+              <a:rPr lang="nl-BE" dirty="0"/>
+              <a:t>Unit Testing</a:t>
+            </a:r>
+          </a:p>
+          <a:p>
+            <a:r>
+              <a:rPr lang="nl-BE" dirty="0"/>
+              <a:t>Version Control</a:t>
+            </a:r>
+          </a:p>
+          <a:p>
+            <a:r>
+              <a:rPr lang="nl-BE" dirty="0"/>
+              <a:t>Databases</a:t>
+            </a:r>
+          </a:p>
+          <a:p>
+            <a:r>
+              <a:rPr lang="nl-BE" dirty="0"/>
+              <a:t>Tools</a:t>
+            </a:r>
+          </a:p>
+          <a:p>
+            <a:r>
+              <a:rPr lang="nl-BE" dirty="0" smtClean="0"/>
+              <a:t>Plugins</a:t>
+            </a:r>
             <a:endParaRPr lang="nl-BE" dirty="0"/>
           </a:p>
         </p:txBody>
@@ -29353,11 +29633,7 @@
           <a:p>
             <a:r>
               <a:rPr lang="nl-BE" dirty="0" smtClean="0"/>
-              <a:t>Using </a:t>
-            </a:r>
-            <a:r>
-              <a:rPr lang="nl-BE" dirty="0" smtClean="0"/>
-              <a:t>Karma or JSTestDriver.</a:t>
+              <a:t>Using Karma or JSTestDriver.</a:t>
             </a:r>
           </a:p>
           <a:p>

</xml_diff>

<commit_message>
Added Go to Test in slide deck
</commit_message>
<xml_diff>
--- a/PhpStorm Workshop.pptx
+++ b/PhpStorm Workshop.pptx
@@ -926,6 +926,90 @@
           <a:bodyPr/>
           <a:lstStyle/>
           <a:p>
+            <a:endParaRPr lang="nl-BE"/>
+          </a:p>
+        </p:txBody>
+      </p:sp>
+      <p:sp>
+        <p:nvSpPr>
+          <p:cNvPr id="4" name="Slide Number Placeholder 3"/>
+          <p:cNvSpPr>
+            <a:spLocks noGrp="1"/>
+          </p:cNvSpPr>
+          <p:nvPr>
+            <p:ph type="sldNum" sz="quarter" idx="10"/>
+          </p:nvPr>
+        </p:nvSpPr>
+        <p:spPr/>
+        <p:txBody>
+          <a:bodyPr/>
+          <a:lstStyle/>
+          <a:p>
+            <a:fld id="{F4591CFF-43FB-4AFC-853D-B477333C48F4}" type="slidenum">
+              <a:rPr lang="nl-BE" smtClean="0"/>
+              <a:t>91</a:t>
+            </a:fld>
+            <a:endParaRPr lang="nl-BE"/>
+          </a:p>
+        </p:txBody>
+      </p:sp>
+    </p:spTree>
+    <p:extLst>
+      <p:ext uri="{BB962C8B-B14F-4D97-AF65-F5344CB8AC3E}">
+        <p14:creationId xmlns:p14="http://schemas.microsoft.com/office/powerpoint/2010/main" val="1803892049"/>
+      </p:ext>
+    </p:extLst>
+  </p:cSld>
+  <p:clrMapOvr>
+    <a:masterClrMapping/>
+  </p:clrMapOvr>
+</p:notes>
+</file>
+
+<file path=ppt/notesSlides/notesSlide3.xml><?xml version="1.0" encoding="utf-8"?>
+<p:notes xmlns:a="http://schemas.openxmlformats.org/drawingml/2006/main" xmlns:r="http://schemas.openxmlformats.org/officeDocument/2006/relationships" xmlns:p="http://schemas.openxmlformats.org/presentationml/2006/main">
+  <p:cSld>
+    <p:spTree>
+      <p:nvGrpSpPr>
+        <p:cNvPr id="1" name=""/>
+        <p:cNvGrpSpPr/>
+        <p:nvPr/>
+      </p:nvGrpSpPr>
+      <p:grpSpPr>
+        <a:xfrm>
+          <a:off x="0" y="0"/>
+          <a:ext cx="0" cy="0"/>
+          <a:chOff x="0" y="0"/>
+          <a:chExt cx="0" cy="0"/>
+        </a:xfrm>
+      </p:grpSpPr>
+      <p:sp>
+        <p:nvSpPr>
+          <p:cNvPr id="2" name="Slide Image Placeholder 1"/>
+          <p:cNvSpPr>
+            <a:spLocks noGrp="1" noRot="1" noChangeAspect="1"/>
+          </p:cNvSpPr>
+          <p:nvPr>
+            <p:ph type="sldImg"/>
+          </p:nvPr>
+        </p:nvSpPr>
+        <p:spPr/>
+      </p:sp>
+      <p:sp>
+        <p:nvSpPr>
+          <p:cNvPr id="3" name="Notes Placeholder 2"/>
+          <p:cNvSpPr>
+            <a:spLocks noGrp="1"/>
+          </p:cNvSpPr>
+          <p:nvPr>
+            <p:ph type="body" idx="1"/>
+          </p:nvPr>
+        </p:nvSpPr>
+        <p:spPr/>
+        <p:txBody>
+          <a:bodyPr/>
+          <a:lstStyle/>
+          <a:p>
             <a:r>
               <a:rPr lang="nl-BE" dirty="0" smtClean="0"/>
               <a:t>Have you ever...</a:t>
@@ -1069,7 +1153,7 @@
 </p:notes>
 </file>
 
-<file path=ppt/notesSlides/notesSlide3.xml><?xml version="1.0" encoding="utf-8"?>
+<file path=ppt/notesSlides/notesSlide4.xml><?xml version="1.0" encoding="utf-8"?>
 <p:notes xmlns:a="http://schemas.openxmlformats.org/drawingml/2006/main" xmlns:r="http://schemas.openxmlformats.org/officeDocument/2006/relationships" xmlns:p="http://schemas.openxmlformats.org/presentationml/2006/main">
   <p:cSld>
     <p:spTree>
@@ -10485,11 +10569,7 @@
           <a:p>
             <a:r>
               <a:rPr lang="nl-BE" dirty="0" smtClean="0"/>
-              <a:t>Start PhpStorm and if a project is opened, close </a:t>
-            </a:r>
-            <a:r>
-              <a:rPr lang="nl-BE" dirty="0" smtClean="0"/>
-              <a:t>it</a:t>
+              <a:t>Start PhpStorm and if a project is opened, close it</a:t>
             </a:r>
           </a:p>
           <a:p>
@@ -10517,15 +10597,7 @@
           <a:p>
             <a:r>
               <a:rPr lang="nl-BE" sz="2000" i="1" dirty="0" smtClean="0"/>
-              <a:t>Alternatively, u</a:t>
-            </a:r>
-            <a:r>
-              <a:rPr lang="nl-BE" sz="2000" i="1" dirty="0" smtClean="0"/>
-              <a:t>se </a:t>
-            </a:r>
-            <a:r>
-              <a:rPr lang="nl-BE" sz="2000" i="1" dirty="0" smtClean="0"/>
-              <a:t>“Checkout from Version Control”</a:t>
+              <a:t>Alternatively, use “Checkout from Version Control”</a:t>
             </a:r>
           </a:p>
           <a:p>
@@ -10558,13 +10630,8 @@
             <a:pPr lvl="1"/>
             <a:r>
               <a:rPr lang="nl-BE" sz="2000" i="1" dirty="0" smtClean="0"/>
-              <a:t>Project / directory name: </a:t>
-            </a:r>
-            <a:r>
-              <a:rPr lang="nl-BE" sz="2000" i="1" dirty="0" smtClean="0"/>
-              <a:t>Workshop</a:t>
-            </a:r>
-            <a:endParaRPr lang="nl-BE" sz="2000" i="1" dirty="0" smtClean="0"/>
+              <a:t>Project / directory name: Workshop</a:t>
+            </a:r>
           </a:p>
         </p:txBody>
       </p:sp>
@@ -28812,7 +28879,7 @@
           <p:nvPr/>
         </p:nvPicPr>
         <p:blipFill>
-          <a:blip r:embed="rId2"/>
+          <a:blip r:embed="rId3"/>
           <a:stretch>
             <a:fillRect/>
           </a:stretch>
@@ -28888,7 +28955,7 @@
         <p:spPr>
           <a:xfrm>
             <a:off x="1398095" y="5011199"/>
-            <a:ext cx="991041" cy="338554"/>
+            <a:ext cx="3231462" cy="338554"/>
           </a:xfrm>
           <a:prstGeom prst="rect">
             <a:avLst/>
@@ -28905,7 +28972,27 @@
               <a:rPr lang="nl-BE" sz="1600" dirty="0" smtClean="0"/>
               <a:t>Alt+Insert</a:t>
             </a:r>
-            <a:endParaRPr lang="nl-BE" sz="1600" dirty="0"/>
+            <a:r>
+              <a:rPr lang="en-US" sz="1600" dirty="0" smtClean="0"/>
+              <a:t> </a:t>
+            </a:r>
+            <a:r>
+              <a:rPr lang="en-US" sz="1600" dirty="0"/>
+              <a:t>or </a:t>
+            </a:r>
+            <a:r>
+              <a:rPr lang="en-US" sz="1600" dirty="0" err="1"/>
+              <a:t>Ctrl+Shift+T</a:t>
+            </a:r>
+            <a:r>
+              <a:rPr lang="en-US" sz="1600" dirty="0"/>
+              <a:t> (Go to Test</a:t>
+            </a:r>
+            <a:r>
+              <a:rPr lang="en-US" sz="1600" dirty="0" smtClean="0"/>
+              <a:t>)</a:t>
+            </a:r>
+            <a:endParaRPr lang="en-US" sz="1600" dirty="0"/>
           </a:p>
         </p:txBody>
       </p:sp>
@@ -28918,7 +29005,7 @@
         <p:spPr>
           <a:xfrm>
             <a:off x="1398095" y="5408377"/>
-            <a:ext cx="1251561" cy="338554"/>
+            <a:ext cx="4036298" cy="338554"/>
           </a:xfrm>
           <a:prstGeom prst="rect">
             <a:avLst/>
@@ -28933,9 +29020,29 @@
           <a:p>
             <a:r>
               <a:rPr lang="nl-BE" sz="1600" dirty="0" smtClean="0"/>
-              <a:t>Command+N</a:t>
-            </a:r>
-            <a:endParaRPr lang="nl-BE" sz="1600" dirty="0"/>
+              <a:t>Command+N </a:t>
+            </a:r>
+            <a:r>
+              <a:rPr lang="en-US" sz="1600" dirty="0" smtClean="0"/>
+              <a:t>or </a:t>
+            </a:r>
+            <a:r>
+              <a:rPr lang="en-US" sz="1600" dirty="0" err="1" smtClean="0"/>
+              <a:t>Command+Shift+T</a:t>
+            </a:r>
+            <a:r>
+              <a:rPr lang="en-US" sz="1600" dirty="0" smtClean="0"/>
+              <a:t> </a:t>
+            </a:r>
+            <a:r>
+              <a:rPr lang="en-US" sz="1600" dirty="0"/>
+              <a:t>(Go to Test</a:t>
+            </a:r>
+            <a:r>
+              <a:rPr lang="en-US" sz="1600" dirty="0" smtClean="0"/>
+              <a:t>)</a:t>
+            </a:r>
+            <a:endParaRPr lang="en-US" sz="1600" dirty="0"/>
           </a:p>
         </p:txBody>
       </p:sp>
@@ -28948,7 +29055,7 @@
           <p:nvPr/>
         </p:nvPicPr>
         <p:blipFill rotWithShape="1">
-          <a:blip r:embed="rId3"/>
+          <a:blip r:embed="rId4"/>
           <a:srcRect r="38380"/>
           <a:stretch/>
         </p:blipFill>
@@ -28971,7 +29078,7 @@
           <p:nvPr/>
         </p:nvPicPr>
         <p:blipFill rotWithShape="1">
-          <a:blip r:embed="rId3"/>
+          <a:blip r:embed="rId4"/>
           <a:srcRect l="67484" t="-15573" b="-1"/>
           <a:stretch/>
         </p:blipFill>
@@ -28994,7 +29101,7 @@
           <p:nvPr/>
         </p:nvPicPr>
         <p:blipFill>
-          <a:blip r:embed="rId4">
+          <a:blip r:embed="rId5">
             <a:clrChange>
               <a:clrFrom>
                 <a:srgbClr val="FFFFFF"/>
@@ -29012,7 +29119,7 @@
         </p:blipFill>
         <p:spPr>
           <a:xfrm>
-            <a:off x="4696065" y="2635846"/>
+            <a:off x="4763529" y="2425578"/>
             <a:ext cx="2266950" cy="2924175"/>
           </a:xfrm>
           <a:prstGeom prst="rect">

</xml_diff>

<commit_message>
Incorrect screenshot for navigation bar
</commit_message>
<xml_diff>
--- a/PhpStorm Workshop.pptx
+++ b/PhpStorm Workshop.pptx
@@ -536,7 +536,7 @@
           <a:p>
             <a:fld id="{452BE2B3-0986-4328-AEFF-1FEDD7FB83AD}" type="datetimeFigureOut">
               <a:rPr lang="nl-BE" smtClean="0"/>
-              <a:t>24/01/2014</a:t>
+              <a:t>27/01/2014</a:t>
             </a:fld>
             <a:endParaRPr lang="nl-BE"/>
           </a:p>
@@ -12253,7 +12253,7 @@
       </p:pic>
       <p:pic>
         <p:nvPicPr>
-          <p:cNvPr id="3" name="Content Placeholder 2"/>
+          <p:cNvPr id="6" name="Content Placeholder 5"/>
           <p:cNvPicPr>
             <a:picLocks noGrp="1" noChangeAspect="1"/>
           </p:cNvPicPr>
@@ -12269,8 +12269,8 @@
         </p:blipFill>
         <p:spPr>
           <a:xfrm>
-            <a:off x="6153654" y="1706725"/>
-            <a:ext cx="4378904" cy="4351013"/>
+            <a:off x="681066" y="3569707"/>
+            <a:ext cx="11033432" cy="625049"/>
           </a:xfrm>
           <a:prstGeom prst="rect">
             <a:avLst/>

</xml_diff>

<commit_message>
Updated slide deck with Mac OS X 10.5+ keybindings
</commit_message>
<xml_diff>
--- a/PhpStorm Workshop.pptx
+++ b/PhpStorm Workshop.pptx
@@ -536,7 +536,7 @@
           <a:p>
             <a:fld id="{452BE2B3-0986-4328-AEFF-1FEDD7FB83AD}" type="datetimeFigureOut">
               <a:rPr lang="nl-BE" smtClean="0"/>
-              <a:t>27/01/2014</a:t>
+              <a:t>26/02/2014</a:t>
             </a:fld>
             <a:endParaRPr lang="nl-BE"/>
           </a:p>
@@ -5068,52 +5068,6 @@
           </a:p>
         </p:txBody>
       </p:sp>
-      <p:sp>
-        <p:nvSpPr>
-          <p:cNvPr id="2" name="Rectangle 1"/>
-          <p:cNvSpPr/>
-          <p:nvPr/>
-        </p:nvSpPr>
-        <p:spPr>
-          <a:xfrm>
-            <a:off x="3048000" y="6171847"/>
-            <a:ext cx="6096000" cy="646331"/>
-          </a:xfrm>
-          <a:prstGeom prst="rect">
-            <a:avLst/>
-          </a:prstGeom>
-        </p:spPr>
-        <p:txBody>
-          <a:bodyPr>
-            <a:spAutoFit/>
-          </a:bodyPr>
-          <a:lstStyle/>
-          <a:p>
-            <a:pPr algn="ctr"/>
-            <a:r>
-              <a:rPr lang="en-US" dirty="0"/>
-              <a:t>This workshop presentation is property of JetBrains and can only be </a:t>
-            </a:r>
-            <a:r>
-              <a:rPr lang="en-US"/>
-              <a:t>used </a:t>
-            </a:r>
-            <a:r>
-              <a:rPr lang="en-US" smtClean="0"/>
-              <a:t>commercially with </a:t>
-            </a:r>
-            <a:r>
-              <a:rPr lang="en-US" dirty="0"/>
-              <a:t>prior permission</a:t>
-            </a:r>
-            <a:r>
-              <a:rPr lang="en-US" dirty="0" smtClean="0"/>
-              <a:t>.</a:t>
-            </a:r>
-            <a:endParaRPr lang="en-GB" dirty="0"/>
-          </a:p>
-        </p:txBody>
-      </p:sp>
       <p:pic>
         <p:nvPicPr>
           <p:cNvPr id="6" name="Picture 5"/>
@@ -7885,7 +7839,7 @@
           <a:p>
             <a:r>
               <a:rPr lang="nl-BE" sz="1600" dirty="0" smtClean="0"/>
-              <a:t>Command+Shift+F10</a:t>
+              <a:t>Shift+Command+F10</a:t>
             </a:r>
             <a:endParaRPr lang="nl-BE" sz="1600" dirty="0"/>
           </a:p>
@@ -9143,7 +9097,11 @@
           <a:p>
             <a:r>
               <a:rPr lang="nl-BE" sz="1600" dirty="0" smtClean="0"/>
-              <a:t>Command+Alt+Left / Right</a:t>
+              <a:t>Alt+Command+Left </a:t>
+            </a:r>
+            <a:r>
+              <a:rPr lang="nl-BE" sz="1600" dirty="0" smtClean="0"/>
+              <a:t>/ Right</a:t>
             </a:r>
             <a:endParaRPr lang="nl-BE" sz="1600" dirty="0"/>
           </a:p>
@@ -9715,7 +9673,7 @@
           <a:p>
             <a:r>
               <a:rPr lang="nl-BE" sz="1600" dirty="0" smtClean="0"/>
-              <a:t>Command+Shift+X</a:t>
+              <a:t>Shift+Command+X</a:t>
             </a:r>
             <a:endParaRPr lang="nl-BE" sz="1600" dirty="0"/>
           </a:p>
@@ -10757,7 +10715,11 @@
               <a:rPr lang="nl-BE" sz="2000" i="1" dirty="0" smtClean="0">
                 <a:hlinkClick r:id="rId2"/>
               </a:rPr>
-              <a:t>github.com/maartenba-demo/phpstorm-workshop.git</a:t>
+              <a:t>github.com/jetbrains/phpstorm-workshop.git</a:t>
+            </a:r>
+            <a:r>
+              <a:rPr lang="nl-BE" sz="2000" i="1" dirty="0" smtClean="0"/>
+              <a:t> </a:t>
             </a:r>
             <a:endParaRPr lang="nl-BE" sz="2000" i="1" dirty="0" smtClean="0"/>
           </a:p>
@@ -11955,7 +11917,7 @@
         <p:spPr>
           <a:xfrm>
             <a:off x="1398095" y="5408377"/>
-            <a:ext cx="1181029" cy="338554"/>
+            <a:ext cx="574196" cy="338554"/>
           </a:xfrm>
           <a:prstGeom prst="rect">
             <a:avLst/>
@@ -11970,7 +11932,7 @@
           <a:p>
             <a:r>
               <a:rPr lang="nl-BE" sz="1600" dirty="0" smtClean="0"/>
-              <a:t>Command+1</a:t>
+              <a:t>Alt+1</a:t>
             </a:r>
             <a:endParaRPr lang="nl-BE" sz="1600" dirty="0"/>
           </a:p>
@@ -12673,7 +12635,7 @@
           <a:p>
             <a:r>
               <a:rPr lang="nl-BE" sz="1600" dirty="0" smtClean="0"/>
-              <a:t>Command+Shift+O</a:t>
+              <a:t>Shift+Command+O</a:t>
             </a:r>
             <a:endParaRPr lang="nl-BE" sz="1600" dirty="0"/>
           </a:p>
@@ -12895,7 +12857,7 @@
         <p:spPr>
           <a:xfrm>
             <a:off x="1398095" y="5408377"/>
-            <a:ext cx="1724511" cy="338554"/>
+            <a:ext cx="1567352" cy="338554"/>
           </a:xfrm>
           <a:prstGeom prst="rect">
             <a:avLst/>
@@ -12910,7 +12872,7 @@
           <a:p>
             <a:r>
               <a:rPr lang="nl-BE" sz="1600" dirty="0" smtClean="0"/>
-              <a:t>Command+Shift+O</a:t>
+              <a:t>Alt+Command+O</a:t>
             </a:r>
             <a:endParaRPr lang="nl-BE" sz="1600" dirty="0"/>
           </a:p>
@@ -13825,7 +13787,7 @@
           <a:p>
             <a:r>
               <a:rPr lang="nl-BE" sz="1600" dirty="0" smtClean="0"/>
-              <a:t>Command+Alt+Left </a:t>
+              <a:t>Alt+Command+Left </a:t>
             </a:r>
             <a:r>
               <a:rPr lang="nl-BE" sz="1600" dirty="0"/>
@@ -14483,9 +14445,10 @@
           <a:lstStyle/>
           <a:p>
             <a:r>
-              <a:rPr lang="nl-BE" sz="1600" dirty="0"/>
-              <a:t>Command+Shift+Backspace</a:t>
-            </a:r>
+              <a:rPr lang="nl-BE" sz="1600" dirty="0" smtClean="0"/>
+              <a:t>Shift+Command+Backspace</a:t>
+            </a:r>
+            <a:endParaRPr lang="nl-BE" sz="1600" dirty="0"/>
           </a:p>
         </p:txBody>
       </p:sp>
@@ -14696,7 +14659,11 @@
             <a:pPr lvl="1"/>
             <a:r>
               <a:rPr lang="nl-BE" dirty="0" smtClean="0"/>
-              <a:t>Shift+F3 Show bookmarks</a:t>
+              <a:t>Command+F3 </a:t>
+            </a:r>
+            <a:r>
+              <a:rPr lang="nl-BE" dirty="0" smtClean="0"/>
+              <a:t>Show bookmarks</a:t>
             </a:r>
           </a:p>
           <a:p>
@@ -14918,7 +14885,7 @@
           <a:p>
             <a:r>
               <a:rPr lang="nl-BE" sz="1600" dirty="0" smtClean="0"/>
-              <a:t>Command+Alt+B</a:t>
+              <a:t>Alt+Command+B</a:t>
             </a:r>
             <a:endParaRPr lang="nl-BE" sz="1600" dirty="0"/>
           </a:p>
@@ -15923,7 +15890,7 @@
           <a:p>
             <a:r>
               <a:rPr lang="nl-BE" sz="1600" dirty="0" smtClean="0"/>
-              <a:t>Command+Shift+F7</a:t>
+              <a:t>Shift+Command+F7</a:t>
             </a:r>
             <a:endParaRPr lang="nl-BE" sz="1600" dirty="0"/>
           </a:p>
@@ -16142,7 +16109,11 @@
             </a:r>
             <a:r>
               <a:rPr lang="nl-BE" sz="1600" dirty="0" smtClean="0"/>
-              <a:t>(Command+Alt+F7 for </a:t>
+              <a:t>(Alt+Command+F7 </a:t>
+            </a:r>
+            <a:r>
+              <a:rPr lang="nl-BE" sz="1600" dirty="0" smtClean="0"/>
+              <a:t>for </a:t>
             </a:r>
             <a:r>
               <a:rPr lang="nl-BE" sz="1600" dirty="0"/>
@@ -16733,11 +16704,11 @@
           <a:p>
             <a:r>
               <a:rPr lang="nl-BE" sz="1600" dirty="0"/>
-              <a:t>Ctrl+Space (</a:t>
+              <a:t>Ctrl+Space </a:t>
             </a:r>
             <a:r>
               <a:rPr lang="nl-BE" sz="1600" dirty="0" smtClean="0"/>
-              <a:t>Command+Shift+Enter </a:t>
+              <a:t>(Shift+Command+Enter </a:t>
             </a:r>
             <a:r>
               <a:rPr lang="nl-BE" sz="1600" dirty="0"/>
@@ -16970,11 +16941,11 @@
           <a:p>
             <a:r>
               <a:rPr lang="nl-BE" sz="1600" dirty="0"/>
-              <a:t>Ctrl+Space (</a:t>
+              <a:t>Ctrl+Space </a:t>
             </a:r>
             <a:r>
               <a:rPr lang="nl-BE" sz="1600" dirty="0" smtClean="0"/>
-              <a:t>Command+Shift+Enter </a:t>
+              <a:t>(Shift+Command+Enter </a:t>
             </a:r>
             <a:r>
               <a:rPr lang="nl-BE" sz="1600" dirty="0"/>
@@ -17409,7 +17380,7 @@
           <a:p>
             <a:r>
               <a:rPr lang="nl-BE" sz="1600" dirty="0" smtClean="0"/>
-              <a:t>Command+Shift+Insert</a:t>
+              <a:t>Shift+Command+Insert</a:t>
             </a:r>
             <a:endParaRPr lang="nl-BE" sz="1600" dirty="0"/>
           </a:p>
@@ -17878,7 +17849,7 @@
           <a:p>
             <a:r>
               <a:rPr lang="nl-BE" sz="1600" dirty="0" smtClean="0"/>
-              <a:t>Command+Alt+T </a:t>
+              <a:t>Alt+Command+T </a:t>
             </a:r>
             <a:r>
               <a:rPr lang="nl-BE" sz="1600" dirty="0"/>
@@ -18666,7 +18637,11 @@
           <a:p>
             <a:r>
               <a:rPr lang="nl-BE" sz="1600" dirty="0" smtClean="0"/>
-              <a:t>Command+Alt+L (reformat)</a:t>
+              <a:t>Alt+Command+L </a:t>
+            </a:r>
+            <a:r>
+              <a:rPr lang="nl-BE" sz="1600" dirty="0" smtClean="0"/>
+              <a:t>(reformat)</a:t>
             </a:r>
             <a:endParaRPr lang="nl-BE" sz="1600" dirty="0"/>
           </a:p>
@@ -20611,7 +20586,7 @@
           <a:p>
             <a:r>
               <a:rPr lang="nl-BE" sz="1600" dirty="0" smtClean="0"/>
-              <a:t>Command+Alt+Up </a:t>
+              <a:t>Alt+Command+Up </a:t>
             </a:r>
             <a:r>
               <a:rPr lang="nl-BE" sz="1600" dirty="0"/>
@@ -21468,7 +21443,7 @@
           <a:p>
             <a:r>
               <a:rPr lang="nl-BE" sz="1600" dirty="0" smtClean="0"/>
-              <a:t>Command+Alt+T </a:t>
+              <a:t>Alt+Command+T </a:t>
             </a:r>
             <a:r>
               <a:rPr lang="nl-BE" sz="1600" dirty="0"/>
@@ -21476,7 +21451,7 @@
             </a:r>
             <a:r>
               <a:rPr lang="nl-BE" sz="1600" dirty="0" smtClean="0"/>
-              <a:t>Command+Alt+J</a:t>
+              <a:t>Alt+Command+J</a:t>
             </a:r>
             <a:endParaRPr lang="nl-BE" sz="1600" dirty="0"/>
           </a:p>
@@ -23428,7 +23403,7 @@
           <a:p>
             <a:r>
               <a:rPr lang="nl-BE" sz="1600" dirty="0" smtClean="0"/>
-              <a:t>Command+Alt+C</a:t>
+              <a:t>Alt+Command+C</a:t>
             </a:r>
             <a:endParaRPr lang="nl-BE" sz="1600" dirty="0"/>
           </a:p>
@@ -23686,7 +23661,7 @@
           <a:p>
             <a:r>
               <a:rPr lang="nl-BE" sz="1600" dirty="0" smtClean="0"/>
-              <a:t>Command+Alt+F</a:t>
+              <a:t>Alt+Command+F</a:t>
             </a:r>
             <a:endParaRPr lang="nl-BE" sz="1600" dirty="0"/>
           </a:p>
@@ -24128,7 +24103,7 @@
           <a:p>
             <a:r>
               <a:rPr lang="nl-BE" sz="1600" dirty="0" smtClean="0"/>
-              <a:t>Command+Alt+M</a:t>
+              <a:t>Alt+Command+M</a:t>
             </a:r>
             <a:endParaRPr lang="nl-BE" sz="1600" dirty="0"/>
           </a:p>
@@ -24402,7 +24377,7 @@
           <a:p>
             <a:r>
               <a:rPr lang="nl-BE" sz="1600" dirty="0" smtClean="0"/>
-              <a:t>Command+Alt+P</a:t>
+              <a:t>Alt+Command+P</a:t>
             </a:r>
             <a:endParaRPr lang="nl-BE" sz="1600" dirty="0"/>
           </a:p>
@@ -24684,7 +24659,7 @@
           <a:p>
             <a:r>
               <a:rPr lang="nl-BE" sz="1600" dirty="0" smtClean="0"/>
-              <a:t>Command+Alt+V</a:t>
+              <a:t>Alt+Command+V</a:t>
             </a:r>
             <a:endParaRPr lang="nl-BE" sz="1600" dirty="0"/>
           </a:p>
@@ -24950,7 +24925,7 @@
           <a:p>
             <a:r>
               <a:rPr lang="nl-BE" sz="1600" dirty="0" smtClean="0"/>
-              <a:t>Command+Alt+N</a:t>
+              <a:t>Alt+Command+N</a:t>
             </a:r>
             <a:endParaRPr lang="nl-BE" sz="1600" dirty="0"/>
           </a:p>
@@ -27035,7 +27010,7 @@
           <a:p>
             <a:r>
               <a:rPr lang="nl-BE" sz="1600" dirty="0" smtClean="0"/>
-              <a:t>Command+Shift+F8</a:t>
+              <a:t>Shift+Command+F8</a:t>
             </a:r>
             <a:endParaRPr lang="nl-BE" sz="1600" dirty="0"/>
           </a:p>
@@ -27465,7 +27440,7 @@
           <a:p>
             <a:r>
               <a:rPr lang="nl-BE" sz="1600" dirty="0" smtClean="0"/>
-              <a:t>Command+Shift+F8</a:t>
+              <a:t>Shift+Command+F8</a:t>
             </a:r>
             <a:endParaRPr lang="nl-BE" sz="1600" dirty="0"/>
           </a:p>
@@ -27700,7 +27675,7 @@
           <a:p>
             <a:r>
               <a:rPr lang="nl-BE" sz="1600" dirty="0" smtClean="0"/>
-              <a:t>Command+Shift+F8</a:t>
+              <a:t>Shift+Command+F8</a:t>
             </a:r>
             <a:endParaRPr lang="nl-BE" sz="1600" dirty="0"/>
           </a:p>

</xml_diff>

<commit_message>
OSX Keymappings incorrect in slides #4
</commit_message>
<xml_diff>
--- a/PhpStorm Workshop.pptx
+++ b/PhpStorm Workshop.pptx
@@ -534,7 +534,7 @@
           <a:p>
             <a:fld id="{452BE2B3-0986-4328-AEFF-1FEDD7FB83AD}" type="datetimeFigureOut">
               <a:rPr lang="nl-BE" smtClean="0"/>
-              <a:t>26/02/2014</a:t>
+              <a:t>6/03/2014</a:t>
             </a:fld>
             <a:endParaRPr lang="nl-BE"/>
           </a:p>
@@ -7161,7 +7161,7 @@
         <p:spPr>
           <a:xfrm>
             <a:off x="1398095" y="5408377"/>
-            <a:ext cx="2400337" cy="338554"/>
+            <a:ext cx="3564181" cy="338554"/>
           </a:xfrm>
           <a:prstGeom prst="rect">
             <a:avLst/>
@@ -7176,7 +7176,7 @@
           <a:p>
             <a:r>
               <a:rPr lang="nl-BE" sz="1600" dirty="0" smtClean="0"/>
-              <a:t>Alt+Command+Left / Right</a:t>
+              <a:t>Command+Shift+[ / ] (or Ctrl+Left / Right)</a:t>
             </a:r>
             <a:endParaRPr lang="nl-BE" sz="1600" dirty="0"/>
           </a:p>
@@ -11414,7 +11414,7 @@
         <p:spPr>
           <a:xfrm>
             <a:off x="1398095" y="5408377"/>
-            <a:ext cx="574196" cy="338554"/>
+            <a:ext cx="715260" cy="338554"/>
           </a:xfrm>
           <a:prstGeom prst="rect">
             <a:avLst/>
@@ -11429,7 +11429,7 @@
           <a:p>
             <a:r>
               <a:rPr lang="nl-BE" sz="1600" dirty="0" smtClean="0"/>
-              <a:t>Alt+1</a:t>
+              <a:t>Cmd+1</a:t>
             </a:r>
             <a:endParaRPr lang="nl-BE" sz="1600" dirty="0"/>
           </a:p>
@@ -12751,15 +12751,7 @@
           <a:p>
             <a:r>
               <a:rPr lang="en-US" dirty="0" smtClean="0"/>
-              <a:t>Make sure you have PhpStorm </a:t>
-            </a:r>
-            <a:r>
-              <a:rPr lang="en-US" dirty="0" smtClean="0"/>
-              <a:t>7.1+ </a:t>
-            </a:r>
-            <a:r>
-              <a:rPr lang="en-US" dirty="0" smtClean="0"/>
-              <a:t>installed</a:t>
+              <a:t>Make sure you have PhpStorm 7.1+ installed</a:t>
             </a:r>
           </a:p>
           <a:p>
@@ -12941,8 +12933,16 @@
           <a:lstStyle/>
           <a:p>
             <a:r>
-              <a:rPr lang="en-GB" dirty="0"/>
-              <a:t>Ctrl-click for </a:t>
+              <a:rPr lang="en-GB" dirty="0" smtClean="0"/>
+              <a:t>Ctrl-click (or </a:t>
+            </a:r>
+            <a:r>
+              <a:rPr lang="en-GB" dirty="0" err="1" smtClean="0"/>
+              <a:t>Command+Click</a:t>
+            </a:r>
+            <a:r>
+              <a:rPr lang="en-GB" dirty="0" smtClean="0"/>
+              <a:t>) on </a:t>
             </a:r>
             <a:r>
               <a:rPr lang="en-GB" dirty="0" smtClean="0"/>
@@ -12971,7 +12971,7 @@
         <p:spPr>
           <a:xfrm>
             <a:off x="1398095" y="5011199"/>
-            <a:ext cx="678391" cy="338554"/>
+            <a:ext cx="1715534" cy="338554"/>
           </a:xfrm>
           <a:prstGeom prst="rect">
             <a:avLst/>
@@ -12986,7 +12986,7 @@
           <a:p>
             <a:r>
               <a:rPr lang="nl-BE" sz="1600" dirty="0" smtClean="0"/>
-              <a:t>Ctrl+B</a:t>
+              <a:t>Ctrl+Click or Ctrl+B</a:t>
             </a:r>
             <a:endParaRPr lang="nl-BE" sz="1600" dirty="0"/>
           </a:p>
@@ -13001,7 +13001,7 @@
         <p:spPr>
           <a:xfrm>
             <a:off x="1398095" y="5408377"/>
-            <a:ext cx="1222707" cy="338554"/>
+            <a:ext cx="2804166" cy="338554"/>
           </a:xfrm>
           <a:prstGeom prst="rect">
             <a:avLst/>
@@ -13016,7 +13016,7 @@
           <a:p>
             <a:r>
               <a:rPr lang="nl-BE" sz="1600" dirty="0" smtClean="0"/>
-              <a:t>Command+B</a:t>
+              <a:t>Command+Click or Command+B</a:t>
             </a:r>
             <a:endParaRPr lang="nl-BE" sz="1600" dirty="0"/>
           </a:p>
@@ -15234,11 +15234,7 @@
           <a:p>
             <a:r>
               <a:rPr lang="en-US" dirty="0" smtClean="0"/>
-              <a:t>Do </a:t>
-            </a:r>
-            <a:r>
-              <a:rPr lang="en-US" dirty="0" smtClean="0"/>
-              <a:t>ask questions!</a:t>
+              <a:t>Do ask questions!</a:t>
             </a:r>
             <a:endParaRPr lang="en-GB" dirty="0"/>
           </a:p>

</xml_diff>

<commit_message>
Updated some typos in the slide deck
</commit_message>
<xml_diff>
--- a/PhpStorm Workshop.pptx
+++ b/PhpStorm Workshop.pptx
@@ -534,7 +534,7 @@
           <a:p>
             <a:fld id="{452BE2B3-0986-4328-AEFF-1FEDD7FB83AD}" type="datetimeFigureOut">
               <a:rPr lang="nl-BE" smtClean="0"/>
-              <a:t>11/03/2014</a:t>
+              <a:t>30/07/2014</a:t>
             </a:fld>
             <a:endParaRPr lang="nl-BE"/>
           </a:p>
@@ -22305,7 +22305,11 @@
             <a:pPr lvl="1"/>
             <a:r>
               <a:rPr lang="nl-BE" dirty="0" smtClean="0"/>
-              <a:t>Usign drag/drop with Ctrl key pressed)</a:t>
+              <a:t>Using </a:t>
+            </a:r>
+            <a:r>
+              <a:rPr lang="nl-BE" dirty="0" smtClean="0"/>
+              <a:t>drag/drop with Ctrl key pressed)</a:t>
             </a:r>
           </a:p>
         </p:txBody>
@@ -23090,7 +23094,15 @@
             <a:pPr lvl="1"/>
             <a:r>
               <a:rPr lang="nl-BE" dirty="0" smtClean="0"/>
-              <a:t>Optionally chaneg namespace</a:t>
+              <a:t>Optionally </a:t>
+            </a:r>
+            <a:r>
+              <a:rPr lang="nl-BE" dirty="0" smtClean="0"/>
+              <a:t>change </a:t>
+            </a:r>
+            <a:r>
+              <a:rPr lang="nl-BE" dirty="0" smtClean="0"/>
+              <a:t>namespace</a:t>
             </a:r>
           </a:p>
           <a:p>
@@ -23262,8 +23274,21 @@
           <a:p>
             <a:r>
               <a:rPr lang="nl-BE" dirty="0"/>
-              <a:t>Extracts a block of code into a method, detecting variables.</a:t>
-            </a:r>
+              <a:t>Extracts a block of code </a:t>
+            </a:r>
+            <a:r>
+              <a:rPr lang="nl-BE" dirty="0" smtClean="0"/>
+              <a:t>into a </a:t>
+            </a:r>
+            <a:r>
+              <a:rPr lang="nl-BE" dirty="0"/>
+              <a:t>method, detecting </a:t>
+            </a:r>
+            <a:r>
+              <a:rPr lang="nl-BE" dirty="0" smtClean="0"/>
+              <a:t>parameters and return values.</a:t>
+            </a:r>
+            <a:endParaRPr lang="nl-BE" dirty="0"/>
           </a:p>
         </p:txBody>
       </p:sp>
@@ -24079,7 +24104,11 @@
             </a:r>
             <a:r>
               <a:rPr lang="nl-BE" b="1" dirty="0" smtClean="0"/>
-              <a:t>Extract Method</a:t>
+              <a:t>Extract </a:t>
+            </a:r>
+            <a:r>
+              <a:rPr lang="nl-BE" b="1" dirty="0" smtClean="0"/>
+              <a:t>Variable / Method</a:t>
             </a:r>
             <a:r>
               <a:rPr lang="nl-BE" dirty="0" smtClean="0"/>

</xml_diff>